<commit_message>
Fixed small error in schematic
</commit_message>
<xml_diff>
--- a/Analog elektronik/Diagrams_BJT.pptx
+++ b/Analog elektronik/Diagrams_BJT.pptx
@@ -106,6 +106,11 @@
       </a:defRPr>
     </a:lvl9pPr>
   </p:defaultTextStyle>
+  <p:extLst>
+    <p:ext uri="{EFAFB233-063F-42B5-8137-9DF3F51BA10A}">
+      <p15:sldGuideLst xmlns:p15="http://schemas.microsoft.com/office/powerpoint/2012/main"/>
+    </p:ext>
+  </p:extLst>
 </p:presentation>
 </file>
 
@@ -5170,6 +5175,46 @@
           </a:p>
         </p:txBody>
       </p:sp>
+      <p:sp>
+        <p:nvSpPr>
+          <p:cNvPr id="2" name="Tekstfelt 1">
+            <a:extLst>
+              <a:ext uri="{FF2B5EF4-FFF2-40B4-BE49-F238E27FC236}">
+                <a16:creationId xmlns:a16="http://schemas.microsoft.com/office/drawing/2014/main" id="{4503062A-0E02-3114-355C-19CE65AADBDF}"/>
+              </a:ext>
+            </a:extLst>
+          </p:cNvPr>
+          <p:cNvSpPr txBox="1"/>
+          <p:nvPr/>
+        </p:nvSpPr>
+        <p:spPr>
+          <a:xfrm>
+            <a:off x="3398329" y="2106618"/>
+            <a:ext cx="802403" cy="276999"/>
+          </a:xfrm>
+          <a:prstGeom prst="rect">
+            <a:avLst/>
+          </a:prstGeom>
+          <a:noFill/>
+        </p:spPr>
+        <p:txBody>
+          <a:bodyPr wrap="square" rtlCol="0">
+            <a:spAutoFit/>
+          </a:bodyPr>
+          <a:lstStyle/>
+          <a:p>
+            <a:r>
+              <a:rPr lang="da-DK" sz="1200" dirty="0"/>
+              <a:t>gm*</a:t>
+            </a:r>
+            <a:r>
+              <a:rPr lang="da-DK" sz="1200" dirty="0" err="1"/>
+              <a:t>Vbe</a:t>
+            </a:r>
+            <a:endParaRPr lang="da-DK" sz="1200" dirty="0"/>
+          </a:p>
+        </p:txBody>
+      </p:sp>
     </p:spTree>
     <p:extLst>
       <p:ext uri="{BB962C8B-B14F-4D97-AF65-F5344CB8AC3E}">
@@ -5694,8 +5739,12 @@
             <a:lstStyle/>
             <a:p>
               <a:r>
+                <a:rPr lang="da-DK" sz="1200" dirty="0" err="1"/>
+                <a:t>Rbe</a:t>
+              </a:r>
+              <a:r>
                 <a:rPr lang="da-DK" sz="1200" dirty="0"/>
-                <a:t>R0 = 100</a:t>
+                <a:t> = x</a:t>
               </a:r>
               <a:r>
                 <a:rPr lang="el-GR" sz="1200" dirty="0"/>
@@ -7496,6 +7545,46 @@
           </p:txBody>
         </p:sp>
       </p:grpSp>
+      <p:sp>
+        <p:nvSpPr>
+          <p:cNvPr id="3" name="Tekstfelt 2">
+            <a:extLst>
+              <a:ext uri="{FF2B5EF4-FFF2-40B4-BE49-F238E27FC236}">
+                <a16:creationId xmlns:a16="http://schemas.microsoft.com/office/drawing/2014/main" id="{641F100E-68AF-3739-1EA8-E61CF98E4BB4}"/>
+              </a:ext>
+            </a:extLst>
+          </p:cNvPr>
+          <p:cNvSpPr txBox="1"/>
+          <p:nvPr/>
+        </p:nvSpPr>
+        <p:spPr>
+          <a:xfrm>
+            <a:off x="5251368" y="2034156"/>
+            <a:ext cx="802403" cy="276999"/>
+          </a:xfrm>
+          <a:prstGeom prst="rect">
+            <a:avLst/>
+          </a:prstGeom>
+          <a:noFill/>
+        </p:spPr>
+        <p:txBody>
+          <a:bodyPr wrap="square" rtlCol="0">
+            <a:spAutoFit/>
+          </a:bodyPr>
+          <a:lstStyle/>
+          <a:p>
+            <a:r>
+              <a:rPr lang="da-DK" sz="1200" dirty="0"/>
+              <a:t>gm*</a:t>
+            </a:r>
+            <a:r>
+              <a:rPr lang="da-DK" sz="1200" dirty="0" err="1"/>
+              <a:t>Vbe</a:t>
+            </a:r>
+            <a:endParaRPr lang="da-DK" sz="1200" dirty="0"/>
+          </a:p>
+        </p:txBody>
+      </p:sp>
     </p:spTree>
     <p:extLst>
       <p:ext uri="{BB962C8B-B14F-4D97-AF65-F5344CB8AC3E}">

</xml_diff>

<commit_message>
Added expanded small-signal model
</commit_message>
<xml_diff>
--- a/Analog elektronik/Diagrams_BJT.pptx
+++ b/Analog elektronik/Diagrams_BJT.pptx
@@ -7,7 +7,8 @@
   <p:sldIdLst>
     <p:sldId id="256" r:id="rId2"/>
     <p:sldId id="257" r:id="rId3"/>
-    <p:sldId id="258" r:id="rId4"/>
+    <p:sldId id="259" r:id="rId4"/>
+    <p:sldId id="258" r:id="rId5"/>
   </p:sldIdLst>
   <p:sldSz cx="12192000" cy="6858000"/>
   <p:notesSz cx="6858000" cy="9144000"/>
@@ -261,7 +262,7 @@
           <a:p>
             <a:fld id="{07F1134A-591F-4889-A8F7-180982371E0F}" type="datetimeFigureOut">
               <a:rPr lang="da-DK" smtClean="0"/>
-              <a:t>24-05-2024</a:t>
+              <a:t>04-06-2024</a:t>
             </a:fld>
             <a:endParaRPr lang="da-DK"/>
           </a:p>
@@ -459,7 +460,7 @@
           <a:p>
             <a:fld id="{07F1134A-591F-4889-A8F7-180982371E0F}" type="datetimeFigureOut">
               <a:rPr lang="da-DK" smtClean="0"/>
-              <a:t>24-05-2024</a:t>
+              <a:t>04-06-2024</a:t>
             </a:fld>
             <a:endParaRPr lang="da-DK"/>
           </a:p>
@@ -667,7 +668,7 @@
           <a:p>
             <a:fld id="{07F1134A-591F-4889-A8F7-180982371E0F}" type="datetimeFigureOut">
               <a:rPr lang="da-DK" smtClean="0"/>
-              <a:t>24-05-2024</a:t>
+              <a:t>04-06-2024</a:t>
             </a:fld>
             <a:endParaRPr lang="da-DK"/>
           </a:p>
@@ -865,7 +866,7 @@
           <a:p>
             <a:fld id="{07F1134A-591F-4889-A8F7-180982371E0F}" type="datetimeFigureOut">
               <a:rPr lang="da-DK" smtClean="0"/>
-              <a:t>24-05-2024</a:t>
+              <a:t>04-06-2024</a:t>
             </a:fld>
             <a:endParaRPr lang="da-DK"/>
           </a:p>
@@ -1140,7 +1141,7 @@
           <a:p>
             <a:fld id="{07F1134A-591F-4889-A8F7-180982371E0F}" type="datetimeFigureOut">
               <a:rPr lang="da-DK" smtClean="0"/>
-              <a:t>24-05-2024</a:t>
+              <a:t>04-06-2024</a:t>
             </a:fld>
             <a:endParaRPr lang="da-DK"/>
           </a:p>
@@ -1405,7 +1406,7 @@
           <a:p>
             <a:fld id="{07F1134A-591F-4889-A8F7-180982371E0F}" type="datetimeFigureOut">
               <a:rPr lang="da-DK" smtClean="0"/>
-              <a:t>24-05-2024</a:t>
+              <a:t>04-06-2024</a:t>
             </a:fld>
             <a:endParaRPr lang="da-DK"/>
           </a:p>
@@ -1817,7 +1818,7 @@
           <a:p>
             <a:fld id="{07F1134A-591F-4889-A8F7-180982371E0F}" type="datetimeFigureOut">
               <a:rPr lang="da-DK" smtClean="0"/>
-              <a:t>24-05-2024</a:t>
+              <a:t>04-06-2024</a:t>
             </a:fld>
             <a:endParaRPr lang="da-DK"/>
           </a:p>
@@ -1958,7 +1959,7 @@
           <a:p>
             <a:fld id="{07F1134A-591F-4889-A8F7-180982371E0F}" type="datetimeFigureOut">
               <a:rPr lang="da-DK" smtClean="0"/>
-              <a:t>24-05-2024</a:t>
+              <a:t>04-06-2024</a:t>
             </a:fld>
             <a:endParaRPr lang="da-DK"/>
           </a:p>
@@ -2071,7 +2072,7 @@
           <a:p>
             <a:fld id="{07F1134A-591F-4889-A8F7-180982371E0F}" type="datetimeFigureOut">
               <a:rPr lang="da-DK" smtClean="0"/>
-              <a:t>24-05-2024</a:t>
+              <a:t>04-06-2024</a:t>
             </a:fld>
             <a:endParaRPr lang="da-DK"/>
           </a:p>
@@ -2382,7 +2383,7 @@
           <a:p>
             <a:fld id="{07F1134A-591F-4889-A8F7-180982371E0F}" type="datetimeFigureOut">
               <a:rPr lang="da-DK" smtClean="0"/>
-              <a:t>24-05-2024</a:t>
+              <a:t>04-06-2024</a:t>
             </a:fld>
             <a:endParaRPr lang="da-DK"/>
           </a:p>
@@ -2670,7 +2671,7 @@
           <a:p>
             <a:fld id="{07F1134A-591F-4889-A8F7-180982371E0F}" type="datetimeFigureOut">
               <a:rPr lang="da-DK" smtClean="0"/>
-              <a:t>24-05-2024</a:t>
+              <a:t>04-06-2024</a:t>
             </a:fld>
             <a:endParaRPr lang="da-DK"/>
           </a:p>
@@ -2911,7 +2912,7 @@
           <a:p>
             <a:fld id="{07F1134A-591F-4889-A8F7-180982371E0F}" type="datetimeFigureOut">
               <a:rPr lang="da-DK" smtClean="0"/>
-              <a:t>24-05-2024</a:t>
+              <a:t>04-06-2024</a:t>
             </a:fld>
             <a:endParaRPr lang="da-DK"/>
           </a:p>
@@ -6607,7 +6608,7 @@
         </p:nvGrpSpPr>
         <p:grpSpPr>
           <a:xfrm rot="5400000">
-            <a:off x="1961045" y="1604205"/>
+            <a:off x="1970098" y="1604205"/>
             <a:ext cx="1096502" cy="1206183"/>
             <a:chOff x="1282714" y="578229"/>
             <a:chExt cx="1096502" cy="1206183"/>
@@ -7599,6 +7600,2865 @@
 </file>
 
 <file path=ppt/slides/slide3.xml><?xml version="1.0" encoding="utf-8"?>
+<p:sld xmlns:a="http://schemas.openxmlformats.org/drawingml/2006/main" xmlns:r="http://schemas.openxmlformats.org/officeDocument/2006/relationships" xmlns:p="http://schemas.openxmlformats.org/presentationml/2006/main">
+  <p:cSld>
+    <p:spTree>
+      <p:nvGrpSpPr>
+        <p:cNvPr id="1" name=""/>
+        <p:cNvGrpSpPr/>
+        <p:nvPr/>
+      </p:nvGrpSpPr>
+      <p:grpSpPr>
+        <a:xfrm>
+          <a:off x="0" y="0"/>
+          <a:ext cx="0" cy="0"/>
+          <a:chOff x="0" y="0"/>
+          <a:chExt cx="0" cy="0"/>
+        </a:xfrm>
+      </p:grpSpPr>
+      <p:sp>
+        <p:nvSpPr>
+          <p:cNvPr id="2" name="Titel 1">
+            <a:extLst>
+              <a:ext uri="{FF2B5EF4-FFF2-40B4-BE49-F238E27FC236}">
+                <a16:creationId xmlns:a16="http://schemas.microsoft.com/office/drawing/2014/main" id="{28B4A379-FD1F-77C0-C20F-97EB36842E3B}"/>
+              </a:ext>
+            </a:extLst>
+          </p:cNvPr>
+          <p:cNvSpPr>
+            <a:spLocks noGrp="1"/>
+          </p:cNvSpPr>
+          <p:nvPr>
+            <p:ph type="title"/>
+          </p:nvPr>
+        </p:nvSpPr>
+        <p:spPr>
+          <a:xfrm>
+            <a:off x="838200" y="365126"/>
+            <a:ext cx="10515600" cy="372293"/>
+          </a:xfrm>
+        </p:spPr>
+        <p:txBody>
+          <a:bodyPr>
+            <a:normAutofit/>
+          </a:bodyPr>
+          <a:lstStyle/>
+          <a:p>
+            <a:r>
+              <a:rPr lang="da-DK" sz="1800" dirty="0"/>
+              <a:t>Small signal model</a:t>
+            </a:r>
+          </a:p>
+        </p:txBody>
+      </p:sp>
+      <p:cxnSp>
+        <p:nvCxnSpPr>
+          <p:cNvPr id="10" name="Lige forbindelse 9">
+            <a:extLst>
+              <a:ext uri="{FF2B5EF4-FFF2-40B4-BE49-F238E27FC236}">
+                <a16:creationId xmlns:a16="http://schemas.microsoft.com/office/drawing/2014/main" id="{79C9EFDC-28BD-9BC8-2C47-22FCCC002981}"/>
+              </a:ext>
+            </a:extLst>
+          </p:cNvPr>
+          <p:cNvCxnSpPr>
+            <a:cxnSpLocks/>
+          </p:cNvCxnSpPr>
+          <p:nvPr/>
+        </p:nvCxnSpPr>
+        <p:spPr>
+          <a:xfrm>
+            <a:off x="1190634" y="2582970"/>
+            <a:ext cx="0" cy="540000"/>
+          </a:xfrm>
+          <a:prstGeom prst="line">
+            <a:avLst/>
+          </a:prstGeom>
+          <a:ln w="12700">
+            <a:solidFill>
+              <a:schemeClr val="tx1"/>
+            </a:solidFill>
+          </a:ln>
+        </p:spPr>
+        <p:style>
+          <a:lnRef idx="2">
+            <a:schemeClr val="accent1"/>
+          </a:lnRef>
+          <a:fillRef idx="0">
+            <a:schemeClr val="accent1"/>
+          </a:fillRef>
+          <a:effectRef idx="1">
+            <a:schemeClr val="accent1"/>
+          </a:effectRef>
+          <a:fontRef idx="minor">
+            <a:schemeClr val="tx1"/>
+          </a:fontRef>
+        </p:style>
+      </p:cxnSp>
+      <p:grpSp>
+        <p:nvGrpSpPr>
+          <p:cNvPr id="11" name="Gruppe 10">
+            <a:extLst>
+              <a:ext uri="{FF2B5EF4-FFF2-40B4-BE49-F238E27FC236}">
+                <a16:creationId xmlns:a16="http://schemas.microsoft.com/office/drawing/2014/main" id="{64A30E4E-8BA2-88F3-76BC-722239F3667B}"/>
+              </a:ext>
+            </a:extLst>
+          </p:cNvPr>
+          <p:cNvGrpSpPr/>
+          <p:nvPr/>
+        </p:nvGrpSpPr>
+        <p:grpSpPr>
+          <a:xfrm>
+            <a:off x="637974" y="3131105"/>
+            <a:ext cx="746229" cy="499043"/>
+            <a:chOff x="789479" y="2256503"/>
+            <a:chExt cx="746229" cy="499043"/>
+          </a:xfrm>
+        </p:grpSpPr>
+        <p:sp>
+          <p:nvSpPr>
+            <p:cNvPr id="14" name="Rutediagram: Forbindelse 13">
+              <a:extLst>
+                <a:ext uri="{FF2B5EF4-FFF2-40B4-BE49-F238E27FC236}">
+                  <a16:creationId xmlns:a16="http://schemas.microsoft.com/office/drawing/2014/main" id="{5F9DAD61-492D-8CD9-322B-458984DE6FFD}"/>
+                </a:ext>
+              </a:extLst>
+            </p:cNvPr>
+            <p:cNvSpPr/>
+            <p:nvPr/>
+          </p:nvSpPr>
+          <p:spPr>
+            <a:xfrm>
+              <a:off x="1108047" y="2256503"/>
+              <a:ext cx="427661" cy="428273"/>
+            </a:xfrm>
+            <a:prstGeom prst="flowChartConnector">
+              <a:avLst/>
+            </a:prstGeom>
+            <a:noFill/>
+            <a:ln w="12700">
+              <a:solidFill>
+                <a:schemeClr val="tx1"/>
+              </a:solidFill>
+            </a:ln>
+          </p:spPr>
+          <p:style>
+            <a:lnRef idx="2">
+              <a:schemeClr val="accent1">
+                <a:shade val="15000"/>
+              </a:schemeClr>
+            </a:lnRef>
+            <a:fillRef idx="1">
+              <a:schemeClr val="accent1"/>
+            </a:fillRef>
+            <a:effectRef idx="0">
+              <a:schemeClr val="accent1"/>
+            </a:effectRef>
+            <a:fontRef idx="minor">
+              <a:schemeClr val="lt1"/>
+            </a:fontRef>
+          </p:style>
+          <p:txBody>
+            <a:bodyPr rtlCol="0" anchor="ctr"/>
+            <a:lstStyle/>
+            <a:p>
+              <a:pPr algn="ctr"/>
+              <a:endParaRPr lang="da-DK"/>
+            </a:p>
+          </p:txBody>
+        </p:sp>
+        <p:sp>
+          <p:nvSpPr>
+            <p:cNvPr id="13" name="Tekstfelt 12">
+              <a:extLst>
+                <a:ext uri="{FF2B5EF4-FFF2-40B4-BE49-F238E27FC236}">
+                  <a16:creationId xmlns:a16="http://schemas.microsoft.com/office/drawing/2014/main" id="{BFD57B27-55AE-825F-3ED2-F123E08CA11A}"/>
+                </a:ext>
+              </a:extLst>
+            </p:cNvPr>
+            <p:cNvSpPr txBox="1"/>
+            <p:nvPr/>
+          </p:nvSpPr>
+          <p:spPr>
+            <a:xfrm>
+              <a:off x="789479" y="2293881"/>
+              <a:ext cx="449824" cy="461665"/>
+            </a:xfrm>
+            <a:prstGeom prst="rect">
+              <a:avLst/>
+            </a:prstGeom>
+            <a:noFill/>
+          </p:spPr>
+          <p:txBody>
+            <a:bodyPr wrap="square" rtlCol="0">
+              <a:spAutoFit/>
+            </a:bodyPr>
+            <a:lstStyle/>
+            <a:p>
+              <a:r>
+                <a:rPr lang="da-DK" sz="1200" dirty="0" err="1"/>
+                <a:t>Vs</a:t>
+              </a:r>
+              <a:br>
+                <a:rPr lang="da-DK" sz="1200" dirty="0"/>
+              </a:br>
+              <a:endParaRPr lang="da-DK" sz="1200" dirty="0"/>
+            </a:p>
+          </p:txBody>
+        </p:sp>
+      </p:grpSp>
+      <p:sp>
+        <p:nvSpPr>
+          <p:cNvPr id="22" name="Tekstfelt 21">
+            <a:extLst>
+              <a:ext uri="{FF2B5EF4-FFF2-40B4-BE49-F238E27FC236}">
+                <a16:creationId xmlns:a16="http://schemas.microsoft.com/office/drawing/2014/main" id="{C490E047-3DF9-1998-4C0D-FDC1467D21C8}"/>
+              </a:ext>
+            </a:extLst>
+          </p:cNvPr>
+          <p:cNvSpPr txBox="1"/>
+          <p:nvPr/>
+        </p:nvSpPr>
+        <p:spPr>
+          <a:xfrm>
+            <a:off x="5084164" y="1827923"/>
+            <a:ext cx="567810" cy="1015663"/>
+          </a:xfrm>
+          <a:prstGeom prst="rect">
+            <a:avLst/>
+          </a:prstGeom>
+          <a:noFill/>
+        </p:spPr>
+        <p:txBody>
+          <a:bodyPr wrap="square" rtlCol="0">
+            <a:spAutoFit/>
+          </a:bodyPr>
+          <a:lstStyle/>
+          <a:p>
+            <a:pPr algn="r"/>
+            <a:r>
+              <a:rPr lang="da-DK" sz="1200" dirty="0"/>
+              <a:t>+</a:t>
+            </a:r>
+            <a:br>
+              <a:rPr lang="da-DK" sz="1200" dirty="0"/>
+            </a:br>
+            <a:br>
+              <a:rPr lang="da-DK" sz="1200" dirty="0"/>
+            </a:br>
+            <a:r>
+              <a:rPr lang="da-DK" sz="1200" dirty="0"/>
+              <a:t>V_BE</a:t>
+            </a:r>
+            <a:br>
+              <a:rPr lang="da-DK" sz="1200" dirty="0"/>
+            </a:br>
+            <a:br>
+              <a:rPr lang="da-DK" sz="1200" dirty="0"/>
+            </a:br>
+            <a:r>
+              <a:rPr lang="da-DK" sz="1200" dirty="0"/>
+              <a:t>-</a:t>
+            </a:r>
+          </a:p>
+        </p:txBody>
+      </p:sp>
+      <p:cxnSp>
+        <p:nvCxnSpPr>
+          <p:cNvPr id="23" name="Lige forbindelse 22">
+            <a:extLst>
+              <a:ext uri="{FF2B5EF4-FFF2-40B4-BE49-F238E27FC236}">
+                <a16:creationId xmlns:a16="http://schemas.microsoft.com/office/drawing/2014/main" id="{FA209B55-4803-EB9B-5566-C31BFE86E497}"/>
+              </a:ext>
+            </a:extLst>
+          </p:cNvPr>
+          <p:cNvCxnSpPr>
+            <a:cxnSpLocks/>
+          </p:cNvCxnSpPr>
+          <p:nvPr/>
+        </p:nvCxnSpPr>
+        <p:spPr>
+          <a:xfrm>
+            <a:off x="5803257" y="2719111"/>
+            <a:ext cx="1348429" cy="0"/>
+          </a:xfrm>
+          <a:prstGeom prst="line">
+            <a:avLst/>
+          </a:prstGeom>
+          <a:ln w="12700"/>
+        </p:spPr>
+        <p:style>
+          <a:lnRef idx="2">
+            <a:schemeClr val="dk1"/>
+          </a:lnRef>
+          <a:fillRef idx="0">
+            <a:schemeClr val="dk1"/>
+          </a:fillRef>
+          <a:effectRef idx="1">
+            <a:schemeClr val="dk1"/>
+          </a:effectRef>
+          <a:fontRef idx="minor">
+            <a:schemeClr val="tx1"/>
+          </a:fontRef>
+        </p:style>
+      </p:cxnSp>
+      <p:grpSp>
+        <p:nvGrpSpPr>
+          <p:cNvPr id="24" name="Gruppe 23">
+            <a:extLst>
+              <a:ext uri="{FF2B5EF4-FFF2-40B4-BE49-F238E27FC236}">
+                <a16:creationId xmlns:a16="http://schemas.microsoft.com/office/drawing/2014/main" id="{C5153CE1-1304-78E2-1D76-1B31276A78AC}"/>
+              </a:ext>
+            </a:extLst>
+          </p:cNvPr>
+          <p:cNvGrpSpPr/>
+          <p:nvPr/>
+        </p:nvGrpSpPr>
+        <p:grpSpPr>
+          <a:xfrm rot="5400000">
+            <a:off x="5797757" y="1584622"/>
+            <a:ext cx="1057338" cy="1206183"/>
+            <a:chOff x="1321878" y="578229"/>
+            <a:chExt cx="1057338" cy="1206183"/>
+          </a:xfrm>
+        </p:grpSpPr>
+        <p:grpSp>
+          <p:nvGrpSpPr>
+            <p:cNvPr id="25" name="Gruppe 24">
+              <a:extLst>
+                <a:ext uri="{FF2B5EF4-FFF2-40B4-BE49-F238E27FC236}">
+                  <a16:creationId xmlns:a16="http://schemas.microsoft.com/office/drawing/2014/main" id="{5E05DCF0-BA20-88CA-C4F5-8DA928897211}"/>
+                </a:ext>
+              </a:extLst>
+            </p:cNvPr>
+            <p:cNvGrpSpPr/>
+            <p:nvPr/>
+          </p:nvGrpSpPr>
+          <p:grpSpPr>
+            <a:xfrm>
+              <a:off x="1321878" y="1606858"/>
+              <a:ext cx="1057338" cy="177554"/>
+              <a:chOff x="1321878" y="1606858"/>
+              <a:chExt cx="1057338" cy="177554"/>
+            </a:xfrm>
+          </p:grpSpPr>
+          <p:sp>
+            <p:nvSpPr>
+              <p:cNvPr id="27" name="Rektangel 26">
+                <a:extLst>
+                  <a:ext uri="{FF2B5EF4-FFF2-40B4-BE49-F238E27FC236}">
+                    <a16:creationId xmlns:a16="http://schemas.microsoft.com/office/drawing/2014/main" id="{AE3D2D5F-2F14-A4AA-6194-A5FE6FB59AC9}"/>
+                  </a:ext>
+                </a:extLst>
+              </p:cNvPr>
+              <p:cNvSpPr/>
+              <p:nvPr/>
+            </p:nvSpPr>
+            <p:spPr>
+              <a:xfrm>
+                <a:off x="1518082" y="1606858"/>
+                <a:ext cx="665825" cy="177554"/>
+              </a:xfrm>
+              <a:prstGeom prst="rect">
+                <a:avLst/>
+              </a:prstGeom>
+              <a:noFill/>
+              <a:ln w="12700">
+                <a:solidFill>
+                  <a:schemeClr val="tx1"/>
+                </a:solidFill>
+              </a:ln>
+            </p:spPr>
+            <p:style>
+              <a:lnRef idx="2">
+                <a:schemeClr val="accent1">
+                  <a:shade val="15000"/>
+                </a:schemeClr>
+              </a:lnRef>
+              <a:fillRef idx="1">
+                <a:schemeClr val="accent1"/>
+              </a:fillRef>
+              <a:effectRef idx="0">
+                <a:schemeClr val="accent1"/>
+              </a:effectRef>
+              <a:fontRef idx="minor">
+                <a:schemeClr val="lt1"/>
+              </a:fontRef>
+            </p:style>
+            <p:txBody>
+              <a:bodyPr rtlCol="0" anchor="ctr"/>
+              <a:lstStyle/>
+              <a:p>
+                <a:pPr algn="ctr"/>
+                <a:endParaRPr lang="da-DK"/>
+              </a:p>
+            </p:txBody>
+          </p:sp>
+          <p:cxnSp>
+            <p:nvCxnSpPr>
+              <p:cNvPr id="28" name="Lige forbindelse 27">
+                <a:extLst>
+                  <a:ext uri="{FF2B5EF4-FFF2-40B4-BE49-F238E27FC236}">
+                    <a16:creationId xmlns:a16="http://schemas.microsoft.com/office/drawing/2014/main" id="{E35DD8A9-5A0A-1BE2-67B5-241B13BD95AB}"/>
+                  </a:ext>
+                </a:extLst>
+              </p:cNvPr>
+              <p:cNvCxnSpPr>
+                <a:cxnSpLocks/>
+                <a:stCxn id="27" idx="3"/>
+              </p:cNvCxnSpPr>
+              <p:nvPr/>
+            </p:nvCxnSpPr>
+            <p:spPr>
+              <a:xfrm>
+                <a:off x="2183907" y="1695635"/>
+                <a:ext cx="195309" cy="0"/>
+              </a:xfrm>
+              <a:prstGeom prst="line">
+                <a:avLst/>
+              </a:prstGeom>
+              <a:ln w="12700">
+                <a:solidFill>
+                  <a:schemeClr val="tx1"/>
+                </a:solidFill>
+              </a:ln>
+            </p:spPr>
+            <p:style>
+              <a:lnRef idx="2">
+                <a:schemeClr val="accent1"/>
+              </a:lnRef>
+              <a:fillRef idx="0">
+                <a:schemeClr val="accent1"/>
+              </a:fillRef>
+              <a:effectRef idx="1">
+                <a:schemeClr val="accent1"/>
+              </a:effectRef>
+              <a:fontRef idx="minor">
+                <a:schemeClr val="tx1"/>
+              </a:fontRef>
+            </p:style>
+          </p:cxnSp>
+          <p:cxnSp>
+            <p:nvCxnSpPr>
+              <p:cNvPr id="29" name="Lige forbindelse 28">
+                <a:extLst>
+                  <a:ext uri="{FF2B5EF4-FFF2-40B4-BE49-F238E27FC236}">
+                    <a16:creationId xmlns:a16="http://schemas.microsoft.com/office/drawing/2014/main" id="{96D88E5B-7301-A055-6E2E-2179F071D5D1}"/>
+                  </a:ext>
+                </a:extLst>
+              </p:cNvPr>
+              <p:cNvCxnSpPr>
+                <a:cxnSpLocks/>
+              </p:cNvCxnSpPr>
+              <p:nvPr/>
+            </p:nvCxnSpPr>
+            <p:spPr>
+              <a:xfrm>
+                <a:off x="1321878" y="1702728"/>
+                <a:ext cx="195309" cy="0"/>
+              </a:xfrm>
+              <a:prstGeom prst="line">
+                <a:avLst/>
+              </a:prstGeom>
+              <a:ln w="12700">
+                <a:solidFill>
+                  <a:schemeClr val="tx1"/>
+                </a:solidFill>
+              </a:ln>
+            </p:spPr>
+            <p:style>
+              <a:lnRef idx="2">
+                <a:schemeClr val="accent1"/>
+              </a:lnRef>
+              <a:fillRef idx="0">
+                <a:schemeClr val="accent1"/>
+              </a:fillRef>
+              <a:effectRef idx="1">
+                <a:schemeClr val="accent1"/>
+              </a:effectRef>
+              <a:fontRef idx="minor">
+                <a:schemeClr val="tx1"/>
+              </a:fontRef>
+            </p:style>
+          </p:cxnSp>
+        </p:grpSp>
+        <p:sp>
+          <p:nvSpPr>
+            <p:cNvPr id="26" name="Tekstfelt 25">
+              <a:extLst>
+                <a:ext uri="{FF2B5EF4-FFF2-40B4-BE49-F238E27FC236}">
+                  <a16:creationId xmlns:a16="http://schemas.microsoft.com/office/drawing/2014/main" id="{8B764942-825E-1FE1-13BD-CE84F4DD11F3}"/>
+                </a:ext>
+              </a:extLst>
+            </p:cNvPr>
+            <p:cNvSpPr txBox="1"/>
+            <p:nvPr/>
+          </p:nvSpPr>
+          <p:spPr>
+            <a:xfrm rot="16200000">
+              <a:off x="1395999" y="950356"/>
+              <a:ext cx="1021254" cy="276999"/>
+            </a:xfrm>
+            <a:prstGeom prst="rect">
+              <a:avLst/>
+            </a:prstGeom>
+            <a:noFill/>
+          </p:spPr>
+          <p:txBody>
+            <a:bodyPr wrap="square" rtlCol="0">
+              <a:spAutoFit/>
+            </a:bodyPr>
+            <a:lstStyle/>
+            <a:p>
+              <a:r>
+                <a:rPr lang="da-DK" sz="1200" dirty="0" err="1"/>
+                <a:t>Rbe</a:t>
+              </a:r>
+              <a:r>
+                <a:rPr lang="da-DK" sz="1200" dirty="0"/>
+                <a:t> = x</a:t>
+              </a:r>
+              <a:r>
+                <a:rPr lang="el-GR" sz="1200" dirty="0"/>
+                <a:t>Ω</a:t>
+              </a:r>
+              <a:endParaRPr lang="da-DK" sz="1200" dirty="0"/>
+            </a:p>
+          </p:txBody>
+        </p:sp>
+      </p:grpSp>
+      <p:grpSp>
+        <p:nvGrpSpPr>
+          <p:cNvPr id="30" name="Gruppe 29">
+            <a:extLst>
+              <a:ext uri="{FF2B5EF4-FFF2-40B4-BE49-F238E27FC236}">
+                <a16:creationId xmlns:a16="http://schemas.microsoft.com/office/drawing/2014/main" id="{12AC4C12-A404-B509-EBD7-BDC96EFE6A26}"/>
+              </a:ext>
+            </a:extLst>
+          </p:cNvPr>
+          <p:cNvGrpSpPr/>
+          <p:nvPr/>
+        </p:nvGrpSpPr>
+        <p:grpSpPr>
+          <a:xfrm>
+            <a:off x="6971688" y="1669350"/>
+            <a:ext cx="360000" cy="1056368"/>
+            <a:chOff x="3996808" y="1427106"/>
+            <a:chExt cx="360000" cy="1056368"/>
+          </a:xfrm>
+        </p:grpSpPr>
+        <p:sp>
+          <p:nvSpPr>
+            <p:cNvPr id="31" name="Rektangel 30">
+              <a:extLst>
+                <a:ext uri="{FF2B5EF4-FFF2-40B4-BE49-F238E27FC236}">
+                  <a16:creationId xmlns:a16="http://schemas.microsoft.com/office/drawing/2014/main" id="{658917AA-61C1-BFEB-7CD9-21C55F3AD93A}"/>
+                </a:ext>
+              </a:extLst>
+            </p:cNvPr>
+            <p:cNvSpPr/>
+            <p:nvPr/>
+          </p:nvSpPr>
+          <p:spPr>
+            <a:xfrm rot="2700000">
+              <a:off x="3996808" y="1771114"/>
+              <a:ext cx="360000" cy="360000"/>
+            </a:xfrm>
+            <a:prstGeom prst="rect">
+              <a:avLst/>
+            </a:prstGeom>
+            <a:noFill/>
+            <a:ln w="12700">
+              <a:solidFill>
+                <a:schemeClr val="tx1"/>
+              </a:solidFill>
+            </a:ln>
+          </p:spPr>
+          <p:style>
+            <a:lnRef idx="2">
+              <a:schemeClr val="accent1">
+                <a:shade val="15000"/>
+              </a:schemeClr>
+            </a:lnRef>
+            <a:fillRef idx="1">
+              <a:schemeClr val="accent1"/>
+            </a:fillRef>
+            <a:effectRef idx="0">
+              <a:schemeClr val="accent1"/>
+            </a:effectRef>
+            <a:fontRef idx="minor">
+              <a:schemeClr val="lt1"/>
+            </a:fontRef>
+          </p:style>
+          <p:txBody>
+            <a:bodyPr rtlCol="0" anchor="ctr"/>
+            <a:lstStyle/>
+            <a:p>
+              <a:pPr algn="ctr"/>
+              <a:endParaRPr lang="da-DK"/>
+            </a:p>
+          </p:txBody>
+        </p:sp>
+        <p:cxnSp>
+          <p:nvCxnSpPr>
+            <p:cNvPr id="32" name="Lige pilforbindelse 31">
+              <a:extLst>
+                <a:ext uri="{FF2B5EF4-FFF2-40B4-BE49-F238E27FC236}">
+                  <a16:creationId xmlns:a16="http://schemas.microsoft.com/office/drawing/2014/main" id="{F383D5B0-CEA1-637B-C23A-23AA136E932F}"/>
+                </a:ext>
+              </a:extLst>
+            </p:cNvPr>
+            <p:cNvCxnSpPr/>
+            <p:nvPr/>
+          </p:nvCxnSpPr>
+          <p:spPr>
+            <a:xfrm>
+              <a:off x="4176808" y="1784412"/>
+              <a:ext cx="0" cy="326344"/>
+            </a:xfrm>
+            <a:prstGeom prst="straightConnector1">
+              <a:avLst/>
+            </a:prstGeom>
+            <a:ln w="12700">
+              <a:solidFill>
+                <a:schemeClr val="tx1"/>
+              </a:solidFill>
+              <a:tailEnd type="triangle"/>
+            </a:ln>
+          </p:spPr>
+          <p:style>
+            <a:lnRef idx="2">
+              <a:schemeClr val="accent1"/>
+            </a:lnRef>
+            <a:fillRef idx="0">
+              <a:schemeClr val="accent1"/>
+            </a:fillRef>
+            <a:effectRef idx="1">
+              <a:schemeClr val="accent1"/>
+            </a:effectRef>
+            <a:fontRef idx="minor">
+              <a:schemeClr val="tx1"/>
+            </a:fontRef>
+          </p:style>
+        </p:cxnSp>
+        <p:cxnSp>
+          <p:nvCxnSpPr>
+            <p:cNvPr id="33" name="Lige forbindelse 32">
+              <a:extLst>
+                <a:ext uri="{FF2B5EF4-FFF2-40B4-BE49-F238E27FC236}">
+                  <a16:creationId xmlns:a16="http://schemas.microsoft.com/office/drawing/2014/main" id="{CD0D48C2-7DEF-E276-2B7B-843390168E73}"/>
+                </a:ext>
+              </a:extLst>
+            </p:cNvPr>
+            <p:cNvCxnSpPr>
+              <a:cxnSpLocks/>
+            </p:cNvCxnSpPr>
+            <p:nvPr/>
+          </p:nvCxnSpPr>
+          <p:spPr>
+            <a:xfrm>
+              <a:off x="4176806" y="1427106"/>
+              <a:ext cx="2" cy="272186"/>
+            </a:xfrm>
+            <a:prstGeom prst="line">
+              <a:avLst/>
+            </a:prstGeom>
+            <a:ln w="12700">
+              <a:solidFill>
+                <a:schemeClr val="tx1"/>
+              </a:solidFill>
+            </a:ln>
+          </p:spPr>
+          <p:style>
+            <a:lnRef idx="2">
+              <a:schemeClr val="accent1"/>
+            </a:lnRef>
+            <a:fillRef idx="0">
+              <a:schemeClr val="accent1"/>
+            </a:fillRef>
+            <a:effectRef idx="1">
+              <a:schemeClr val="accent1"/>
+            </a:effectRef>
+            <a:fontRef idx="minor">
+              <a:schemeClr val="tx1"/>
+            </a:fontRef>
+          </p:style>
+        </p:cxnSp>
+        <p:cxnSp>
+          <p:nvCxnSpPr>
+            <p:cNvPr id="34" name="Lige forbindelse 33">
+              <a:extLst>
+                <a:ext uri="{FF2B5EF4-FFF2-40B4-BE49-F238E27FC236}">
+                  <a16:creationId xmlns:a16="http://schemas.microsoft.com/office/drawing/2014/main" id="{D6ABD613-6ECF-B937-4655-2B193C89313A}"/>
+                </a:ext>
+              </a:extLst>
+            </p:cNvPr>
+            <p:cNvCxnSpPr>
+              <a:cxnSpLocks/>
+            </p:cNvCxnSpPr>
+            <p:nvPr/>
+          </p:nvCxnSpPr>
+          <p:spPr>
+            <a:xfrm>
+              <a:off x="4176807" y="2205673"/>
+              <a:ext cx="0" cy="277801"/>
+            </a:xfrm>
+            <a:prstGeom prst="line">
+              <a:avLst/>
+            </a:prstGeom>
+            <a:ln w="12700">
+              <a:solidFill>
+                <a:schemeClr val="tx1"/>
+              </a:solidFill>
+            </a:ln>
+          </p:spPr>
+          <p:style>
+            <a:lnRef idx="2">
+              <a:schemeClr val="accent1"/>
+            </a:lnRef>
+            <a:fillRef idx="0">
+              <a:schemeClr val="accent1"/>
+            </a:fillRef>
+            <a:effectRef idx="1">
+              <a:schemeClr val="accent1"/>
+            </a:effectRef>
+            <a:fontRef idx="minor">
+              <a:schemeClr val="tx1"/>
+            </a:fontRef>
+          </p:style>
+        </p:cxnSp>
+      </p:grpSp>
+      <p:cxnSp>
+        <p:nvCxnSpPr>
+          <p:cNvPr id="48" name="Lige forbindelse 47">
+            <a:extLst>
+              <a:ext uri="{FF2B5EF4-FFF2-40B4-BE49-F238E27FC236}">
+                <a16:creationId xmlns:a16="http://schemas.microsoft.com/office/drawing/2014/main" id="{D6A1FA29-597B-F03A-A6D4-7B3CAD4EB7E1}"/>
+              </a:ext>
+            </a:extLst>
+          </p:cNvPr>
+          <p:cNvCxnSpPr>
+            <a:cxnSpLocks/>
+          </p:cNvCxnSpPr>
+          <p:nvPr/>
+        </p:nvCxnSpPr>
+        <p:spPr>
+          <a:xfrm flipH="1">
+            <a:off x="1170372" y="3561922"/>
+            <a:ext cx="0" cy="252000"/>
+          </a:xfrm>
+          <a:prstGeom prst="line">
+            <a:avLst/>
+          </a:prstGeom>
+          <a:ln w="12700">
+            <a:solidFill>
+              <a:schemeClr val="tx1"/>
+            </a:solidFill>
+          </a:ln>
+        </p:spPr>
+        <p:style>
+          <a:lnRef idx="2">
+            <a:schemeClr val="accent1"/>
+          </a:lnRef>
+          <a:fillRef idx="0">
+            <a:schemeClr val="accent1"/>
+          </a:fillRef>
+          <a:effectRef idx="1">
+            <a:schemeClr val="accent1"/>
+          </a:effectRef>
+          <a:fontRef idx="minor">
+            <a:schemeClr val="tx1"/>
+          </a:fontRef>
+        </p:style>
+      </p:cxnSp>
+      <p:cxnSp>
+        <p:nvCxnSpPr>
+          <p:cNvPr id="49" name="Lige forbindelse 48">
+            <a:extLst>
+              <a:ext uri="{FF2B5EF4-FFF2-40B4-BE49-F238E27FC236}">
+                <a16:creationId xmlns:a16="http://schemas.microsoft.com/office/drawing/2014/main" id="{8B38743B-5BBF-8344-11C5-A6DD3646BCD8}"/>
+              </a:ext>
+            </a:extLst>
+          </p:cNvPr>
+          <p:cNvCxnSpPr>
+            <a:cxnSpLocks/>
+          </p:cNvCxnSpPr>
+          <p:nvPr/>
+        </p:nvCxnSpPr>
+        <p:spPr>
+          <a:xfrm flipV="1">
+            <a:off x="1174157" y="3814479"/>
+            <a:ext cx="9576000" cy="0"/>
+          </a:xfrm>
+          <a:prstGeom prst="line">
+            <a:avLst/>
+          </a:prstGeom>
+          <a:ln w="12700">
+            <a:solidFill>
+              <a:schemeClr val="tx1"/>
+            </a:solidFill>
+          </a:ln>
+        </p:spPr>
+        <p:style>
+          <a:lnRef idx="2">
+            <a:schemeClr val="accent1"/>
+          </a:lnRef>
+          <a:fillRef idx="0">
+            <a:schemeClr val="accent1"/>
+          </a:fillRef>
+          <a:effectRef idx="1">
+            <a:schemeClr val="accent1"/>
+          </a:effectRef>
+          <a:fontRef idx="minor">
+            <a:schemeClr val="tx1"/>
+          </a:fontRef>
+        </p:style>
+      </p:cxnSp>
+      <p:grpSp>
+        <p:nvGrpSpPr>
+          <p:cNvPr id="51" name="Gruppe 50">
+            <a:extLst>
+              <a:ext uri="{FF2B5EF4-FFF2-40B4-BE49-F238E27FC236}">
+                <a16:creationId xmlns:a16="http://schemas.microsoft.com/office/drawing/2014/main" id="{B2A41DE5-8D02-31E1-1906-A9D8A2F852B4}"/>
+              </a:ext>
+            </a:extLst>
+          </p:cNvPr>
+          <p:cNvGrpSpPr/>
+          <p:nvPr/>
+        </p:nvGrpSpPr>
+        <p:grpSpPr>
+          <a:xfrm rot="5400000">
+            <a:off x="9486198" y="2278578"/>
+            <a:ext cx="1057338" cy="1206183"/>
+            <a:chOff x="1321878" y="578229"/>
+            <a:chExt cx="1057338" cy="1206183"/>
+          </a:xfrm>
+        </p:grpSpPr>
+        <p:grpSp>
+          <p:nvGrpSpPr>
+            <p:cNvPr id="52" name="Gruppe 51">
+              <a:extLst>
+                <a:ext uri="{FF2B5EF4-FFF2-40B4-BE49-F238E27FC236}">
+                  <a16:creationId xmlns:a16="http://schemas.microsoft.com/office/drawing/2014/main" id="{F9E29F28-B402-8BB4-0961-972F995F07DA}"/>
+                </a:ext>
+              </a:extLst>
+            </p:cNvPr>
+            <p:cNvGrpSpPr/>
+            <p:nvPr/>
+          </p:nvGrpSpPr>
+          <p:grpSpPr>
+            <a:xfrm>
+              <a:off x="1321878" y="1606858"/>
+              <a:ext cx="1057338" cy="177554"/>
+              <a:chOff x="1321878" y="1606858"/>
+              <a:chExt cx="1057338" cy="177554"/>
+            </a:xfrm>
+          </p:grpSpPr>
+          <p:sp>
+            <p:nvSpPr>
+              <p:cNvPr id="54" name="Rektangel 53">
+                <a:extLst>
+                  <a:ext uri="{FF2B5EF4-FFF2-40B4-BE49-F238E27FC236}">
+                    <a16:creationId xmlns:a16="http://schemas.microsoft.com/office/drawing/2014/main" id="{545AF1E0-2860-41D6-0091-6F92E9F74972}"/>
+                  </a:ext>
+                </a:extLst>
+              </p:cNvPr>
+              <p:cNvSpPr/>
+              <p:nvPr/>
+            </p:nvSpPr>
+            <p:spPr>
+              <a:xfrm>
+                <a:off x="1518082" y="1606858"/>
+                <a:ext cx="665825" cy="177554"/>
+              </a:xfrm>
+              <a:prstGeom prst="rect">
+                <a:avLst/>
+              </a:prstGeom>
+              <a:noFill/>
+              <a:ln w="12700">
+                <a:solidFill>
+                  <a:schemeClr val="tx1"/>
+                </a:solidFill>
+              </a:ln>
+            </p:spPr>
+            <p:style>
+              <a:lnRef idx="2">
+                <a:schemeClr val="accent1">
+                  <a:shade val="15000"/>
+                </a:schemeClr>
+              </a:lnRef>
+              <a:fillRef idx="1">
+                <a:schemeClr val="accent1"/>
+              </a:fillRef>
+              <a:effectRef idx="0">
+                <a:schemeClr val="accent1"/>
+              </a:effectRef>
+              <a:fontRef idx="minor">
+                <a:schemeClr val="lt1"/>
+              </a:fontRef>
+            </p:style>
+            <p:txBody>
+              <a:bodyPr rtlCol="0" anchor="ctr"/>
+              <a:lstStyle/>
+              <a:p>
+                <a:pPr algn="ctr"/>
+                <a:endParaRPr lang="da-DK"/>
+              </a:p>
+            </p:txBody>
+          </p:sp>
+          <p:cxnSp>
+            <p:nvCxnSpPr>
+              <p:cNvPr id="55" name="Lige forbindelse 54">
+                <a:extLst>
+                  <a:ext uri="{FF2B5EF4-FFF2-40B4-BE49-F238E27FC236}">
+                    <a16:creationId xmlns:a16="http://schemas.microsoft.com/office/drawing/2014/main" id="{A30DBDB9-B44B-4ADC-0B0D-A4A00EB752E5}"/>
+                  </a:ext>
+                </a:extLst>
+              </p:cNvPr>
+              <p:cNvCxnSpPr>
+                <a:cxnSpLocks/>
+                <a:stCxn id="54" idx="3"/>
+              </p:cNvCxnSpPr>
+              <p:nvPr/>
+            </p:nvCxnSpPr>
+            <p:spPr>
+              <a:xfrm>
+                <a:off x="2183907" y="1695635"/>
+                <a:ext cx="195309" cy="0"/>
+              </a:xfrm>
+              <a:prstGeom prst="line">
+                <a:avLst/>
+              </a:prstGeom>
+              <a:ln w="12700">
+                <a:solidFill>
+                  <a:schemeClr val="tx1"/>
+                </a:solidFill>
+              </a:ln>
+            </p:spPr>
+            <p:style>
+              <a:lnRef idx="2">
+                <a:schemeClr val="accent1"/>
+              </a:lnRef>
+              <a:fillRef idx="0">
+                <a:schemeClr val="accent1"/>
+              </a:fillRef>
+              <a:effectRef idx="1">
+                <a:schemeClr val="accent1"/>
+              </a:effectRef>
+              <a:fontRef idx="minor">
+                <a:schemeClr val="tx1"/>
+              </a:fontRef>
+            </p:style>
+          </p:cxnSp>
+          <p:cxnSp>
+            <p:nvCxnSpPr>
+              <p:cNvPr id="56" name="Lige forbindelse 55">
+                <a:extLst>
+                  <a:ext uri="{FF2B5EF4-FFF2-40B4-BE49-F238E27FC236}">
+                    <a16:creationId xmlns:a16="http://schemas.microsoft.com/office/drawing/2014/main" id="{455C6196-C6AE-1E6B-41B1-A7C6F53B9CFD}"/>
+                  </a:ext>
+                </a:extLst>
+              </p:cNvPr>
+              <p:cNvCxnSpPr>
+                <a:cxnSpLocks/>
+              </p:cNvCxnSpPr>
+              <p:nvPr/>
+            </p:nvCxnSpPr>
+            <p:spPr>
+              <a:xfrm>
+                <a:off x="1321878" y="1702728"/>
+                <a:ext cx="195309" cy="0"/>
+              </a:xfrm>
+              <a:prstGeom prst="line">
+                <a:avLst/>
+              </a:prstGeom>
+              <a:ln w="12700">
+                <a:solidFill>
+                  <a:schemeClr val="tx1"/>
+                </a:solidFill>
+              </a:ln>
+            </p:spPr>
+            <p:style>
+              <a:lnRef idx="2">
+                <a:schemeClr val="accent1"/>
+              </a:lnRef>
+              <a:fillRef idx="0">
+                <a:schemeClr val="accent1"/>
+              </a:fillRef>
+              <a:effectRef idx="1">
+                <a:schemeClr val="accent1"/>
+              </a:effectRef>
+              <a:fontRef idx="minor">
+                <a:schemeClr val="tx1"/>
+              </a:fontRef>
+            </p:style>
+          </p:cxnSp>
+        </p:grpSp>
+        <p:sp>
+          <p:nvSpPr>
+            <p:cNvPr id="53" name="Tekstfelt 52">
+              <a:extLst>
+                <a:ext uri="{FF2B5EF4-FFF2-40B4-BE49-F238E27FC236}">
+                  <a16:creationId xmlns:a16="http://schemas.microsoft.com/office/drawing/2014/main" id="{26FFA835-6D81-76D9-8E2B-8DC4B0F6E676}"/>
+                </a:ext>
+              </a:extLst>
+            </p:cNvPr>
+            <p:cNvSpPr txBox="1"/>
+            <p:nvPr/>
+          </p:nvSpPr>
+          <p:spPr>
+            <a:xfrm rot="16200000">
+              <a:off x="1395999" y="950356"/>
+              <a:ext cx="1021254" cy="276999"/>
+            </a:xfrm>
+            <a:prstGeom prst="rect">
+              <a:avLst/>
+            </a:prstGeom>
+            <a:noFill/>
+          </p:spPr>
+          <p:txBody>
+            <a:bodyPr wrap="square" rtlCol="0">
+              <a:spAutoFit/>
+            </a:bodyPr>
+            <a:lstStyle/>
+            <a:p>
+              <a:r>
+                <a:rPr lang="da-DK" sz="1200" dirty="0"/>
+                <a:t>RL = 6.2k</a:t>
+              </a:r>
+              <a:r>
+                <a:rPr lang="el-GR" sz="1200" dirty="0"/>
+                <a:t>Ω</a:t>
+              </a:r>
+              <a:endParaRPr lang="da-DK" sz="1200" dirty="0"/>
+            </a:p>
+          </p:txBody>
+        </p:sp>
+      </p:grpSp>
+      <p:grpSp>
+        <p:nvGrpSpPr>
+          <p:cNvPr id="63" name="Gruppe 62">
+            <a:extLst>
+              <a:ext uri="{FF2B5EF4-FFF2-40B4-BE49-F238E27FC236}">
+                <a16:creationId xmlns:a16="http://schemas.microsoft.com/office/drawing/2014/main" id="{F584279E-909E-3448-503F-F032B18253C0}"/>
+              </a:ext>
+            </a:extLst>
+          </p:cNvPr>
+          <p:cNvGrpSpPr/>
+          <p:nvPr/>
+        </p:nvGrpSpPr>
+        <p:grpSpPr>
+          <a:xfrm rot="5400000">
+            <a:off x="8122729" y="2269230"/>
+            <a:ext cx="1057338" cy="1206183"/>
+            <a:chOff x="1321878" y="578229"/>
+            <a:chExt cx="1057338" cy="1206183"/>
+          </a:xfrm>
+        </p:grpSpPr>
+        <p:grpSp>
+          <p:nvGrpSpPr>
+            <p:cNvPr id="64" name="Gruppe 63">
+              <a:extLst>
+                <a:ext uri="{FF2B5EF4-FFF2-40B4-BE49-F238E27FC236}">
+                  <a16:creationId xmlns:a16="http://schemas.microsoft.com/office/drawing/2014/main" id="{21728D0A-FB21-58B6-0A89-F21F46E7BC83}"/>
+                </a:ext>
+              </a:extLst>
+            </p:cNvPr>
+            <p:cNvGrpSpPr/>
+            <p:nvPr/>
+          </p:nvGrpSpPr>
+          <p:grpSpPr>
+            <a:xfrm>
+              <a:off x="1321878" y="1606858"/>
+              <a:ext cx="1057338" cy="177554"/>
+              <a:chOff x="1321878" y="1606858"/>
+              <a:chExt cx="1057338" cy="177554"/>
+            </a:xfrm>
+          </p:grpSpPr>
+          <p:sp>
+            <p:nvSpPr>
+              <p:cNvPr id="66" name="Rektangel 65">
+                <a:extLst>
+                  <a:ext uri="{FF2B5EF4-FFF2-40B4-BE49-F238E27FC236}">
+                    <a16:creationId xmlns:a16="http://schemas.microsoft.com/office/drawing/2014/main" id="{49D7AE05-E2DA-ECC0-856A-F67635318CDC}"/>
+                  </a:ext>
+                </a:extLst>
+              </p:cNvPr>
+              <p:cNvSpPr/>
+              <p:nvPr/>
+            </p:nvSpPr>
+            <p:spPr>
+              <a:xfrm>
+                <a:off x="1518082" y="1606858"/>
+                <a:ext cx="665825" cy="177554"/>
+              </a:xfrm>
+              <a:prstGeom prst="rect">
+                <a:avLst/>
+              </a:prstGeom>
+              <a:noFill/>
+              <a:ln w="12700">
+                <a:solidFill>
+                  <a:schemeClr val="tx1"/>
+                </a:solidFill>
+              </a:ln>
+            </p:spPr>
+            <p:style>
+              <a:lnRef idx="2">
+                <a:schemeClr val="accent1">
+                  <a:shade val="15000"/>
+                </a:schemeClr>
+              </a:lnRef>
+              <a:fillRef idx="1">
+                <a:schemeClr val="accent1"/>
+              </a:fillRef>
+              <a:effectRef idx="0">
+                <a:schemeClr val="accent1"/>
+              </a:effectRef>
+              <a:fontRef idx="minor">
+                <a:schemeClr val="lt1"/>
+              </a:fontRef>
+            </p:style>
+            <p:txBody>
+              <a:bodyPr rtlCol="0" anchor="ctr"/>
+              <a:lstStyle/>
+              <a:p>
+                <a:pPr algn="ctr"/>
+                <a:endParaRPr lang="da-DK"/>
+              </a:p>
+            </p:txBody>
+          </p:sp>
+          <p:cxnSp>
+            <p:nvCxnSpPr>
+              <p:cNvPr id="67" name="Lige forbindelse 66">
+                <a:extLst>
+                  <a:ext uri="{FF2B5EF4-FFF2-40B4-BE49-F238E27FC236}">
+                    <a16:creationId xmlns:a16="http://schemas.microsoft.com/office/drawing/2014/main" id="{68E6B185-971E-0EC6-02CF-5FAE142F768F}"/>
+                  </a:ext>
+                </a:extLst>
+              </p:cNvPr>
+              <p:cNvCxnSpPr>
+                <a:cxnSpLocks/>
+                <a:stCxn id="66" idx="3"/>
+              </p:cNvCxnSpPr>
+              <p:nvPr/>
+            </p:nvCxnSpPr>
+            <p:spPr>
+              <a:xfrm>
+                <a:off x="2183907" y="1695635"/>
+                <a:ext cx="195309" cy="0"/>
+              </a:xfrm>
+              <a:prstGeom prst="line">
+                <a:avLst/>
+              </a:prstGeom>
+              <a:ln w="12700">
+                <a:solidFill>
+                  <a:schemeClr val="tx1"/>
+                </a:solidFill>
+              </a:ln>
+            </p:spPr>
+            <p:style>
+              <a:lnRef idx="2">
+                <a:schemeClr val="accent1"/>
+              </a:lnRef>
+              <a:fillRef idx="0">
+                <a:schemeClr val="accent1"/>
+              </a:fillRef>
+              <a:effectRef idx="1">
+                <a:schemeClr val="accent1"/>
+              </a:effectRef>
+              <a:fontRef idx="minor">
+                <a:schemeClr val="tx1"/>
+              </a:fontRef>
+            </p:style>
+          </p:cxnSp>
+          <p:cxnSp>
+            <p:nvCxnSpPr>
+              <p:cNvPr id="68" name="Lige forbindelse 67">
+                <a:extLst>
+                  <a:ext uri="{FF2B5EF4-FFF2-40B4-BE49-F238E27FC236}">
+                    <a16:creationId xmlns:a16="http://schemas.microsoft.com/office/drawing/2014/main" id="{77FCB4B6-0377-60F3-7D23-27F2CD9CEB10}"/>
+                  </a:ext>
+                </a:extLst>
+              </p:cNvPr>
+              <p:cNvCxnSpPr>
+                <a:cxnSpLocks/>
+              </p:cNvCxnSpPr>
+              <p:nvPr/>
+            </p:nvCxnSpPr>
+            <p:spPr>
+              <a:xfrm>
+                <a:off x="1321878" y="1702728"/>
+                <a:ext cx="195309" cy="0"/>
+              </a:xfrm>
+              <a:prstGeom prst="line">
+                <a:avLst/>
+              </a:prstGeom>
+              <a:ln w="12700">
+                <a:solidFill>
+                  <a:schemeClr val="tx1"/>
+                </a:solidFill>
+              </a:ln>
+            </p:spPr>
+            <p:style>
+              <a:lnRef idx="2">
+                <a:schemeClr val="accent1"/>
+              </a:lnRef>
+              <a:fillRef idx="0">
+                <a:schemeClr val="accent1"/>
+              </a:fillRef>
+              <a:effectRef idx="1">
+                <a:schemeClr val="accent1"/>
+              </a:effectRef>
+              <a:fontRef idx="minor">
+                <a:schemeClr val="tx1"/>
+              </a:fontRef>
+            </p:style>
+          </p:cxnSp>
+        </p:grpSp>
+        <p:sp>
+          <p:nvSpPr>
+            <p:cNvPr id="65" name="Tekstfelt 64">
+              <a:extLst>
+                <a:ext uri="{FF2B5EF4-FFF2-40B4-BE49-F238E27FC236}">
+                  <a16:creationId xmlns:a16="http://schemas.microsoft.com/office/drawing/2014/main" id="{CCE01267-1DB1-255B-290A-75AC6654AEC6}"/>
+                </a:ext>
+              </a:extLst>
+            </p:cNvPr>
+            <p:cNvSpPr txBox="1"/>
+            <p:nvPr/>
+          </p:nvSpPr>
+          <p:spPr>
+            <a:xfrm rot="16200000">
+              <a:off x="1395999" y="950356"/>
+              <a:ext cx="1021254" cy="276999"/>
+            </a:xfrm>
+            <a:prstGeom prst="rect">
+              <a:avLst/>
+            </a:prstGeom>
+            <a:noFill/>
+          </p:spPr>
+          <p:txBody>
+            <a:bodyPr wrap="square" rtlCol="0">
+              <a:spAutoFit/>
+            </a:bodyPr>
+            <a:lstStyle/>
+            <a:p>
+              <a:r>
+                <a:rPr lang="da-DK" sz="1200" dirty="0" err="1"/>
+                <a:t>Rc</a:t>
+              </a:r>
+              <a:r>
+                <a:rPr lang="da-DK" sz="1200" dirty="0"/>
+                <a:t> = 3.3k</a:t>
+              </a:r>
+              <a:r>
+                <a:rPr lang="el-GR" sz="1200" dirty="0"/>
+                <a:t>Ω</a:t>
+              </a:r>
+              <a:endParaRPr lang="da-DK" sz="1200" dirty="0"/>
+            </a:p>
+          </p:txBody>
+        </p:sp>
+      </p:grpSp>
+      <p:sp>
+        <p:nvSpPr>
+          <p:cNvPr id="69" name="Tekstfelt 68">
+            <a:extLst>
+              <a:ext uri="{FF2B5EF4-FFF2-40B4-BE49-F238E27FC236}">
+                <a16:creationId xmlns:a16="http://schemas.microsoft.com/office/drawing/2014/main" id="{78CCBC9E-7D2B-463C-FBFF-85B8EC35EE7A}"/>
+              </a:ext>
+            </a:extLst>
+          </p:cNvPr>
+          <p:cNvSpPr txBox="1"/>
+          <p:nvPr/>
+        </p:nvSpPr>
+        <p:spPr>
+          <a:xfrm>
+            <a:off x="952774" y="2996114"/>
+            <a:ext cx="400302" cy="707886"/>
+          </a:xfrm>
+          <a:prstGeom prst="rect">
+            <a:avLst/>
+          </a:prstGeom>
+          <a:noFill/>
+        </p:spPr>
+        <p:txBody>
+          <a:bodyPr wrap="square" rtlCol="0">
+            <a:spAutoFit/>
+          </a:bodyPr>
+          <a:lstStyle/>
+          <a:p>
+            <a:r>
+              <a:rPr lang="da-DK" sz="4000" dirty="0"/>
+              <a:t>~</a:t>
+            </a:r>
+          </a:p>
+        </p:txBody>
+      </p:sp>
+      <p:sp>
+        <p:nvSpPr>
+          <p:cNvPr id="70" name="Tekstfelt 69">
+            <a:extLst>
+              <a:ext uri="{FF2B5EF4-FFF2-40B4-BE49-F238E27FC236}">
+                <a16:creationId xmlns:a16="http://schemas.microsoft.com/office/drawing/2014/main" id="{13A9F50A-2609-0736-CADA-F594F02B062C}"/>
+              </a:ext>
+            </a:extLst>
+          </p:cNvPr>
+          <p:cNvSpPr txBox="1"/>
+          <p:nvPr/>
+        </p:nvSpPr>
+        <p:spPr>
+          <a:xfrm>
+            <a:off x="936033" y="2877180"/>
+            <a:ext cx="258345" cy="276999"/>
+          </a:xfrm>
+          <a:prstGeom prst="rect">
+            <a:avLst/>
+          </a:prstGeom>
+          <a:noFill/>
+        </p:spPr>
+        <p:txBody>
+          <a:bodyPr wrap="square" rtlCol="0">
+            <a:spAutoFit/>
+          </a:bodyPr>
+          <a:lstStyle/>
+          <a:p>
+            <a:r>
+              <a:rPr lang="da-DK" sz="1200" dirty="0"/>
+              <a:t>+</a:t>
+            </a:r>
+          </a:p>
+        </p:txBody>
+      </p:sp>
+      <p:sp>
+        <p:nvSpPr>
+          <p:cNvPr id="71" name="Tekstfelt 70">
+            <a:extLst>
+              <a:ext uri="{FF2B5EF4-FFF2-40B4-BE49-F238E27FC236}">
+                <a16:creationId xmlns:a16="http://schemas.microsoft.com/office/drawing/2014/main" id="{60166D2B-912C-2AA6-9C93-82921E87C395}"/>
+              </a:ext>
+            </a:extLst>
+          </p:cNvPr>
+          <p:cNvSpPr txBox="1"/>
+          <p:nvPr/>
+        </p:nvSpPr>
+        <p:spPr>
+          <a:xfrm>
+            <a:off x="964130" y="3527709"/>
+            <a:ext cx="247335" cy="276999"/>
+          </a:xfrm>
+          <a:prstGeom prst="rect">
+            <a:avLst/>
+          </a:prstGeom>
+          <a:noFill/>
+        </p:spPr>
+        <p:txBody>
+          <a:bodyPr wrap="square" rtlCol="0">
+            <a:spAutoFit/>
+          </a:bodyPr>
+          <a:lstStyle/>
+          <a:p>
+            <a:r>
+              <a:rPr lang="da-DK" sz="1200" dirty="0"/>
+              <a:t>-</a:t>
+            </a:r>
+          </a:p>
+        </p:txBody>
+      </p:sp>
+      <p:grpSp>
+        <p:nvGrpSpPr>
+          <p:cNvPr id="72" name="Gruppe 71">
+            <a:extLst>
+              <a:ext uri="{FF2B5EF4-FFF2-40B4-BE49-F238E27FC236}">
+                <a16:creationId xmlns:a16="http://schemas.microsoft.com/office/drawing/2014/main" id="{FFA0FE6C-3625-4516-5B65-DCB6CEADA290}"/>
+              </a:ext>
+            </a:extLst>
+          </p:cNvPr>
+          <p:cNvGrpSpPr/>
+          <p:nvPr/>
+        </p:nvGrpSpPr>
+        <p:grpSpPr>
+          <a:xfrm rot="5400000">
+            <a:off x="4068236" y="1604205"/>
+            <a:ext cx="1096502" cy="1206183"/>
+            <a:chOff x="1282714" y="578229"/>
+            <a:chExt cx="1096502" cy="1206183"/>
+          </a:xfrm>
+        </p:grpSpPr>
+        <p:grpSp>
+          <p:nvGrpSpPr>
+            <p:cNvPr id="73" name="Gruppe 72">
+              <a:extLst>
+                <a:ext uri="{FF2B5EF4-FFF2-40B4-BE49-F238E27FC236}">
+                  <a16:creationId xmlns:a16="http://schemas.microsoft.com/office/drawing/2014/main" id="{17F3BDC6-E6C6-82DB-2EC3-00C0BFAE3ABD}"/>
+                </a:ext>
+              </a:extLst>
+            </p:cNvPr>
+            <p:cNvGrpSpPr/>
+            <p:nvPr/>
+          </p:nvGrpSpPr>
+          <p:grpSpPr>
+            <a:xfrm>
+              <a:off x="1282714" y="1606858"/>
+              <a:ext cx="1096502" cy="177554"/>
+              <a:chOff x="1282714" y="1606858"/>
+              <a:chExt cx="1096502" cy="177554"/>
+            </a:xfrm>
+          </p:grpSpPr>
+          <p:sp>
+            <p:nvSpPr>
+              <p:cNvPr id="75" name="Rektangel 74">
+                <a:extLst>
+                  <a:ext uri="{FF2B5EF4-FFF2-40B4-BE49-F238E27FC236}">
+                    <a16:creationId xmlns:a16="http://schemas.microsoft.com/office/drawing/2014/main" id="{E09A3D3C-57C9-66A5-25A5-7A87C7DBC5A9}"/>
+                  </a:ext>
+                </a:extLst>
+              </p:cNvPr>
+              <p:cNvSpPr/>
+              <p:nvPr/>
+            </p:nvSpPr>
+            <p:spPr>
+              <a:xfrm>
+                <a:off x="1518082" y="1606858"/>
+                <a:ext cx="665825" cy="177554"/>
+              </a:xfrm>
+              <a:prstGeom prst="rect">
+                <a:avLst/>
+              </a:prstGeom>
+              <a:noFill/>
+              <a:ln w="12700">
+                <a:solidFill>
+                  <a:schemeClr val="tx1"/>
+                </a:solidFill>
+              </a:ln>
+            </p:spPr>
+            <p:style>
+              <a:lnRef idx="2">
+                <a:schemeClr val="accent1">
+                  <a:shade val="15000"/>
+                </a:schemeClr>
+              </a:lnRef>
+              <a:fillRef idx="1">
+                <a:schemeClr val="accent1"/>
+              </a:fillRef>
+              <a:effectRef idx="0">
+                <a:schemeClr val="accent1"/>
+              </a:effectRef>
+              <a:fontRef idx="minor">
+                <a:schemeClr val="lt1"/>
+              </a:fontRef>
+            </p:style>
+            <p:txBody>
+              <a:bodyPr rtlCol="0" anchor="ctr"/>
+              <a:lstStyle/>
+              <a:p>
+                <a:pPr algn="ctr"/>
+                <a:endParaRPr lang="da-DK"/>
+              </a:p>
+            </p:txBody>
+          </p:sp>
+          <p:cxnSp>
+            <p:nvCxnSpPr>
+              <p:cNvPr id="76" name="Lige forbindelse 75">
+                <a:extLst>
+                  <a:ext uri="{FF2B5EF4-FFF2-40B4-BE49-F238E27FC236}">
+                    <a16:creationId xmlns:a16="http://schemas.microsoft.com/office/drawing/2014/main" id="{46929072-BE14-DD66-177B-E0BA165C27A0}"/>
+                  </a:ext>
+                </a:extLst>
+              </p:cNvPr>
+              <p:cNvCxnSpPr>
+                <a:cxnSpLocks/>
+                <a:stCxn id="75" idx="3"/>
+              </p:cNvCxnSpPr>
+              <p:nvPr/>
+            </p:nvCxnSpPr>
+            <p:spPr>
+              <a:xfrm>
+                <a:off x="2183907" y="1695635"/>
+                <a:ext cx="195309" cy="0"/>
+              </a:xfrm>
+              <a:prstGeom prst="line">
+                <a:avLst/>
+              </a:prstGeom>
+              <a:ln w="12700">
+                <a:solidFill>
+                  <a:schemeClr val="tx1"/>
+                </a:solidFill>
+              </a:ln>
+            </p:spPr>
+            <p:style>
+              <a:lnRef idx="2">
+                <a:schemeClr val="accent1"/>
+              </a:lnRef>
+              <a:fillRef idx="0">
+                <a:schemeClr val="accent1"/>
+              </a:fillRef>
+              <a:effectRef idx="1">
+                <a:schemeClr val="accent1"/>
+              </a:effectRef>
+              <a:fontRef idx="minor">
+                <a:schemeClr val="tx1"/>
+              </a:fontRef>
+            </p:style>
+          </p:cxnSp>
+          <p:cxnSp>
+            <p:nvCxnSpPr>
+              <p:cNvPr id="77" name="Lige forbindelse 76">
+                <a:extLst>
+                  <a:ext uri="{FF2B5EF4-FFF2-40B4-BE49-F238E27FC236}">
+                    <a16:creationId xmlns:a16="http://schemas.microsoft.com/office/drawing/2014/main" id="{8D773DFE-5BA7-18E9-E78E-644EB4FBD9FF}"/>
+                  </a:ext>
+                </a:extLst>
+              </p:cNvPr>
+              <p:cNvCxnSpPr>
+                <a:cxnSpLocks/>
+              </p:cNvCxnSpPr>
+              <p:nvPr/>
+            </p:nvCxnSpPr>
+            <p:spPr>
+              <a:xfrm rot="16200000">
+                <a:off x="1399951" y="1585490"/>
+                <a:ext cx="0" cy="234474"/>
+              </a:xfrm>
+              <a:prstGeom prst="line">
+                <a:avLst/>
+              </a:prstGeom>
+              <a:ln w="12700">
+                <a:solidFill>
+                  <a:schemeClr val="tx1"/>
+                </a:solidFill>
+              </a:ln>
+            </p:spPr>
+            <p:style>
+              <a:lnRef idx="2">
+                <a:schemeClr val="accent1"/>
+              </a:lnRef>
+              <a:fillRef idx="0">
+                <a:schemeClr val="accent1"/>
+              </a:fillRef>
+              <a:effectRef idx="1">
+                <a:schemeClr val="accent1"/>
+              </a:effectRef>
+              <a:fontRef idx="minor">
+                <a:schemeClr val="tx1"/>
+              </a:fontRef>
+            </p:style>
+          </p:cxnSp>
+        </p:grpSp>
+        <p:sp>
+          <p:nvSpPr>
+            <p:cNvPr id="74" name="Tekstfelt 73">
+              <a:extLst>
+                <a:ext uri="{FF2B5EF4-FFF2-40B4-BE49-F238E27FC236}">
+                  <a16:creationId xmlns:a16="http://schemas.microsoft.com/office/drawing/2014/main" id="{1CF5E4E5-A1C1-C1E7-2FFC-6F884AB89C61}"/>
+                </a:ext>
+              </a:extLst>
+            </p:cNvPr>
+            <p:cNvSpPr txBox="1"/>
+            <p:nvPr/>
+          </p:nvSpPr>
+          <p:spPr>
+            <a:xfrm rot="16200000">
+              <a:off x="1395999" y="950356"/>
+              <a:ext cx="1021254" cy="276999"/>
+            </a:xfrm>
+            <a:prstGeom prst="rect">
+              <a:avLst/>
+            </a:prstGeom>
+            <a:noFill/>
+          </p:spPr>
+          <p:txBody>
+            <a:bodyPr wrap="square" rtlCol="0">
+              <a:spAutoFit/>
+            </a:bodyPr>
+            <a:lstStyle/>
+            <a:p>
+              <a:r>
+                <a:rPr lang="da-DK" sz="1200" dirty="0"/>
+                <a:t>Rb2 = 20k</a:t>
+              </a:r>
+              <a:r>
+                <a:rPr lang="el-GR" sz="1200" dirty="0"/>
+                <a:t>Ω</a:t>
+              </a:r>
+              <a:endParaRPr lang="da-DK" sz="1200" dirty="0"/>
+            </a:p>
+          </p:txBody>
+        </p:sp>
+      </p:grpSp>
+      <p:cxnSp>
+        <p:nvCxnSpPr>
+          <p:cNvPr id="82" name="Lige forbindelse 81">
+            <a:extLst>
+              <a:ext uri="{FF2B5EF4-FFF2-40B4-BE49-F238E27FC236}">
+                <a16:creationId xmlns:a16="http://schemas.microsoft.com/office/drawing/2014/main" id="{9E32751B-A3B6-11AB-6E9C-E5BA34BE2988}"/>
+              </a:ext>
+            </a:extLst>
+          </p:cNvPr>
+          <p:cNvCxnSpPr>
+            <a:cxnSpLocks/>
+          </p:cNvCxnSpPr>
+          <p:nvPr/>
+        </p:nvCxnSpPr>
+        <p:spPr>
+          <a:xfrm flipH="1">
+            <a:off x="4098728" y="2705268"/>
+            <a:ext cx="7091" cy="1109211"/>
+          </a:xfrm>
+          <a:prstGeom prst="line">
+            <a:avLst/>
+          </a:prstGeom>
+          <a:ln w="12700">
+            <a:solidFill>
+              <a:schemeClr val="tx1"/>
+            </a:solidFill>
+          </a:ln>
+        </p:spPr>
+        <p:style>
+          <a:lnRef idx="2">
+            <a:schemeClr val="accent1"/>
+          </a:lnRef>
+          <a:fillRef idx="0">
+            <a:schemeClr val="accent1"/>
+          </a:fillRef>
+          <a:effectRef idx="1">
+            <a:schemeClr val="accent1"/>
+          </a:effectRef>
+          <a:fontRef idx="minor">
+            <a:schemeClr val="tx1"/>
+          </a:fontRef>
+        </p:style>
+      </p:cxnSp>
+      <p:cxnSp>
+        <p:nvCxnSpPr>
+          <p:cNvPr id="85" name="Lige forbindelse 84">
+            <a:extLst>
+              <a:ext uri="{FF2B5EF4-FFF2-40B4-BE49-F238E27FC236}">
+                <a16:creationId xmlns:a16="http://schemas.microsoft.com/office/drawing/2014/main" id="{AB312DE5-20DA-37D7-A3E1-972506EFFA79}"/>
+              </a:ext>
+            </a:extLst>
+          </p:cNvPr>
+          <p:cNvCxnSpPr>
+            <a:cxnSpLocks/>
+          </p:cNvCxnSpPr>
+          <p:nvPr/>
+        </p:nvCxnSpPr>
+        <p:spPr>
+          <a:xfrm>
+            <a:off x="8137084" y="3395434"/>
+            <a:ext cx="0" cy="426788"/>
+          </a:xfrm>
+          <a:prstGeom prst="line">
+            <a:avLst/>
+          </a:prstGeom>
+          <a:ln w="12700">
+            <a:solidFill>
+              <a:schemeClr val="tx1"/>
+            </a:solidFill>
+          </a:ln>
+        </p:spPr>
+        <p:style>
+          <a:lnRef idx="2">
+            <a:schemeClr val="accent1"/>
+          </a:lnRef>
+          <a:fillRef idx="0">
+            <a:schemeClr val="accent1"/>
+          </a:fillRef>
+          <a:effectRef idx="1">
+            <a:schemeClr val="accent1"/>
+          </a:effectRef>
+          <a:fontRef idx="minor">
+            <a:schemeClr val="tx1"/>
+          </a:fontRef>
+        </p:style>
+      </p:cxnSp>
+      <p:cxnSp>
+        <p:nvCxnSpPr>
+          <p:cNvPr id="91" name="Lige forbindelse 90">
+            <a:extLst>
+              <a:ext uri="{FF2B5EF4-FFF2-40B4-BE49-F238E27FC236}">
+                <a16:creationId xmlns:a16="http://schemas.microsoft.com/office/drawing/2014/main" id="{0366B969-B549-1E4D-B20C-3E068B6A876F}"/>
+              </a:ext>
+            </a:extLst>
+          </p:cNvPr>
+          <p:cNvCxnSpPr>
+            <a:cxnSpLocks/>
+          </p:cNvCxnSpPr>
+          <p:nvPr/>
+        </p:nvCxnSpPr>
+        <p:spPr>
+          <a:xfrm>
+            <a:off x="9500553" y="3402355"/>
+            <a:ext cx="0" cy="419867"/>
+          </a:xfrm>
+          <a:prstGeom prst="line">
+            <a:avLst/>
+          </a:prstGeom>
+          <a:ln w="12700">
+            <a:solidFill>
+              <a:schemeClr val="tx1"/>
+            </a:solidFill>
+          </a:ln>
+        </p:spPr>
+        <p:style>
+          <a:lnRef idx="2">
+            <a:schemeClr val="accent1"/>
+          </a:lnRef>
+          <a:fillRef idx="0">
+            <a:schemeClr val="accent1"/>
+          </a:fillRef>
+          <a:effectRef idx="1">
+            <a:schemeClr val="accent1"/>
+          </a:effectRef>
+          <a:fontRef idx="minor">
+            <a:schemeClr val="tx1"/>
+          </a:fontRef>
+        </p:style>
+      </p:cxnSp>
+      <p:cxnSp>
+        <p:nvCxnSpPr>
+          <p:cNvPr id="93" name="Lige forbindelse 92">
+            <a:extLst>
+              <a:ext uri="{FF2B5EF4-FFF2-40B4-BE49-F238E27FC236}">
+                <a16:creationId xmlns:a16="http://schemas.microsoft.com/office/drawing/2014/main" id="{BEE1CD9E-1729-A65D-303E-7F53FE1FC76C}"/>
+              </a:ext>
+            </a:extLst>
+          </p:cNvPr>
+          <p:cNvCxnSpPr>
+            <a:cxnSpLocks/>
+          </p:cNvCxnSpPr>
+          <p:nvPr/>
+        </p:nvCxnSpPr>
+        <p:spPr>
+          <a:xfrm>
+            <a:off x="8129991" y="1669350"/>
+            <a:ext cx="0" cy="687705"/>
+          </a:xfrm>
+          <a:prstGeom prst="line">
+            <a:avLst/>
+          </a:prstGeom>
+          <a:ln w="12700">
+            <a:solidFill>
+              <a:schemeClr val="tx1"/>
+            </a:solidFill>
+          </a:ln>
+        </p:spPr>
+        <p:style>
+          <a:lnRef idx="2">
+            <a:schemeClr val="accent1"/>
+          </a:lnRef>
+          <a:fillRef idx="0">
+            <a:schemeClr val="accent1"/>
+          </a:fillRef>
+          <a:effectRef idx="1">
+            <a:schemeClr val="accent1"/>
+          </a:effectRef>
+          <a:fontRef idx="minor">
+            <a:schemeClr val="tx1"/>
+          </a:fontRef>
+        </p:style>
+      </p:cxnSp>
+      <p:cxnSp>
+        <p:nvCxnSpPr>
+          <p:cNvPr id="95" name="Lige forbindelse 94">
+            <a:extLst>
+              <a:ext uri="{FF2B5EF4-FFF2-40B4-BE49-F238E27FC236}">
+                <a16:creationId xmlns:a16="http://schemas.microsoft.com/office/drawing/2014/main" id="{F6185107-39A7-6BB4-0C75-C8EDAD2D9A48}"/>
+              </a:ext>
+            </a:extLst>
+          </p:cNvPr>
+          <p:cNvCxnSpPr>
+            <a:cxnSpLocks/>
+          </p:cNvCxnSpPr>
+          <p:nvPr/>
+        </p:nvCxnSpPr>
+        <p:spPr>
+          <a:xfrm flipH="1">
+            <a:off x="9493460" y="1669350"/>
+            <a:ext cx="7093" cy="700122"/>
+          </a:xfrm>
+          <a:prstGeom prst="line">
+            <a:avLst/>
+          </a:prstGeom>
+          <a:ln w="12700">
+            <a:solidFill>
+              <a:schemeClr val="tx1"/>
+            </a:solidFill>
+          </a:ln>
+        </p:spPr>
+        <p:style>
+          <a:lnRef idx="2">
+            <a:schemeClr val="accent1"/>
+          </a:lnRef>
+          <a:fillRef idx="0">
+            <a:schemeClr val="accent1"/>
+          </a:fillRef>
+          <a:effectRef idx="1">
+            <a:schemeClr val="accent1"/>
+          </a:effectRef>
+          <a:fontRef idx="minor">
+            <a:schemeClr val="tx1"/>
+          </a:fontRef>
+        </p:style>
+      </p:cxnSp>
+      <p:cxnSp>
+        <p:nvCxnSpPr>
+          <p:cNvPr id="97" name="Lige forbindelse 96">
+            <a:extLst>
+              <a:ext uri="{FF2B5EF4-FFF2-40B4-BE49-F238E27FC236}">
+                <a16:creationId xmlns:a16="http://schemas.microsoft.com/office/drawing/2014/main" id="{88BED690-FCEB-F396-913F-E0E0D5541FB9}"/>
+              </a:ext>
+            </a:extLst>
+          </p:cNvPr>
+          <p:cNvCxnSpPr>
+            <a:cxnSpLocks/>
+          </p:cNvCxnSpPr>
+          <p:nvPr/>
+        </p:nvCxnSpPr>
+        <p:spPr>
+          <a:xfrm>
+            <a:off x="1178463" y="1655172"/>
+            <a:ext cx="4626000" cy="0"/>
+          </a:xfrm>
+          <a:prstGeom prst="line">
+            <a:avLst/>
+          </a:prstGeom>
+          <a:ln w="12700">
+            <a:solidFill>
+              <a:schemeClr val="tx1"/>
+            </a:solidFill>
+          </a:ln>
+        </p:spPr>
+        <p:style>
+          <a:lnRef idx="2">
+            <a:schemeClr val="accent1"/>
+          </a:lnRef>
+          <a:fillRef idx="0">
+            <a:schemeClr val="accent1"/>
+          </a:fillRef>
+          <a:effectRef idx="1">
+            <a:schemeClr val="accent1"/>
+          </a:effectRef>
+          <a:fontRef idx="minor">
+            <a:schemeClr val="tx1"/>
+          </a:fontRef>
+        </p:style>
+      </p:cxnSp>
+      <p:cxnSp>
+        <p:nvCxnSpPr>
+          <p:cNvPr id="106" name="Lige forbindelse 105">
+            <a:extLst>
+              <a:ext uri="{FF2B5EF4-FFF2-40B4-BE49-F238E27FC236}">
+                <a16:creationId xmlns:a16="http://schemas.microsoft.com/office/drawing/2014/main" id="{31F0331F-41E0-29C0-3549-9E48E8841BE1}"/>
+              </a:ext>
+            </a:extLst>
+          </p:cNvPr>
+          <p:cNvCxnSpPr>
+            <a:cxnSpLocks/>
+          </p:cNvCxnSpPr>
+          <p:nvPr/>
+        </p:nvCxnSpPr>
+        <p:spPr>
+          <a:xfrm>
+            <a:off x="7146923" y="1669350"/>
+            <a:ext cx="3600000" cy="0"/>
+          </a:xfrm>
+          <a:prstGeom prst="line">
+            <a:avLst/>
+          </a:prstGeom>
+          <a:ln w="12700">
+            <a:solidFill>
+              <a:schemeClr val="tx1"/>
+            </a:solidFill>
+          </a:ln>
+        </p:spPr>
+        <p:style>
+          <a:lnRef idx="2">
+            <a:schemeClr val="accent1"/>
+          </a:lnRef>
+          <a:fillRef idx="0">
+            <a:schemeClr val="accent1"/>
+          </a:fillRef>
+          <a:effectRef idx="1">
+            <a:schemeClr val="accent1"/>
+          </a:effectRef>
+          <a:fontRef idx="minor">
+            <a:schemeClr val="tx1"/>
+          </a:fontRef>
+        </p:style>
+      </p:cxnSp>
+      <p:sp>
+        <p:nvSpPr>
+          <p:cNvPr id="116" name="Rutediagram: Forbindelse 115">
+            <a:extLst>
+              <a:ext uri="{FF2B5EF4-FFF2-40B4-BE49-F238E27FC236}">
+                <a16:creationId xmlns:a16="http://schemas.microsoft.com/office/drawing/2014/main" id="{712A7F0A-BF15-30FF-C349-A0A822504989}"/>
+              </a:ext>
+            </a:extLst>
+          </p:cNvPr>
+          <p:cNvSpPr/>
+          <p:nvPr/>
+        </p:nvSpPr>
+        <p:spPr>
+          <a:xfrm>
+            <a:off x="10746923" y="1624350"/>
+            <a:ext cx="90000" cy="90000"/>
+          </a:xfrm>
+          <a:prstGeom prst="flowChartConnector">
+            <a:avLst/>
+          </a:prstGeom>
+          <a:noFill/>
+          <a:ln w="12700">
+            <a:solidFill>
+              <a:schemeClr val="tx1"/>
+            </a:solidFill>
+          </a:ln>
+        </p:spPr>
+        <p:style>
+          <a:lnRef idx="2">
+            <a:schemeClr val="accent1">
+              <a:shade val="15000"/>
+            </a:schemeClr>
+          </a:lnRef>
+          <a:fillRef idx="1">
+            <a:schemeClr val="accent1"/>
+          </a:fillRef>
+          <a:effectRef idx="0">
+            <a:schemeClr val="accent1"/>
+          </a:effectRef>
+          <a:fontRef idx="minor">
+            <a:schemeClr val="lt1"/>
+          </a:fontRef>
+        </p:style>
+        <p:txBody>
+          <a:bodyPr rtlCol="0" anchor="ctr"/>
+          <a:lstStyle/>
+          <a:p>
+            <a:pPr algn="ctr"/>
+            <a:endParaRPr lang="da-DK"/>
+          </a:p>
+        </p:txBody>
+      </p:sp>
+      <p:sp>
+        <p:nvSpPr>
+          <p:cNvPr id="117" name="Rutediagram: Forbindelse 116">
+            <a:extLst>
+              <a:ext uri="{FF2B5EF4-FFF2-40B4-BE49-F238E27FC236}">
+                <a16:creationId xmlns:a16="http://schemas.microsoft.com/office/drawing/2014/main" id="{D2A78F95-8346-708B-B1BC-8E9C9F3CBF04}"/>
+              </a:ext>
+            </a:extLst>
+          </p:cNvPr>
+          <p:cNvSpPr/>
+          <p:nvPr/>
+        </p:nvSpPr>
+        <p:spPr>
+          <a:xfrm>
+            <a:off x="10741812" y="3769479"/>
+            <a:ext cx="90000" cy="90000"/>
+          </a:xfrm>
+          <a:prstGeom prst="flowChartConnector">
+            <a:avLst/>
+          </a:prstGeom>
+          <a:noFill/>
+          <a:ln w="12700">
+            <a:solidFill>
+              <a:schemeClr val="tx1"/>
+            </a:solidFill>
+          </a:ln>
+        </p:spPr>
+        <p:style>
+          <a:lnRef idx="2">
+            <a:schemeClr val="accent1">
+              <a:shade val="15000"/>
+            </a:schemeClr>
+          </a:lnRef>
+          <a:fillRef idx="1">
+            <a:schemeClr val="accent1"/>
+          </a:fillRef>
+          <a:effectRef idx="0">
+            <a:schemeClr val="accent1"/>
+          </a:effectRef>
+          <a:fontRef idx="minor">
+            <a:schemeClr val="lt1"/>
+          </a:fontRef>
+        </p:style>
+        <p:txBody>
+          <a:bodyPr rtlCol="0" anchor="ctr"/>
+          <a:lstStyle/>
+          <a:p>
+            <a:pPr algn="ctr"/>
+            <a:endParaRPr lang="da-DK"/>
+          </a:p>
+        </p:txBody>
+      </p:sp>
+      <p:sp>
+        <p:nvSpPr>
+          <p:cNvPr id="119" name="Tekstfelt 118">
+            <a:extLst>
+              <a:ext uri="{FF2B5EF4-FFF2-40B4-BE49-F238E27FC236}">
+                <a16:creationId xmlns:a16="http://schemas.microsoft.com/office/drawing/2014/main" id="{C7EE0F3B-771C-602D-FA54-62A6B2DABC40}"/>
+              </a:ext>
+            </a:extLst>
+          </p:cNvPr>
+          <p:cNvSpPr txBox="1"/>
+          <p:nvPr/>
+        </p:nvSpPr>
+        <p:spPr>
+          <a:xfrm>
+            <a:off x="10680715" y="3536857"/>
+            <a:ext cx="247335" cy="276999"/>
+          </a:xfrm>
+          <a:prstGeom prst="rect">
+            <a:avLst/>
+          </a:prstGeom>
+          <a:noFill/>
+        </p:spPr>
+        <p:txBody>
+          <a:bodyPr wrap="square" rtlCol="0">
+            <a:spAutoFit/>
+          </a:bodyPr>
+          <a:lstStyle/>
+          <a:p>
+            <a:r>
+              <a:rPr lang="da-DK" sz="1200" dirty="0"/>
+              <a:t>-</a:t>
+            </a:r>
+          </a:p>
+        </p:txBody>
+      </p:sp>
+      <p:sp>
+        <p:nvSpPr>
+          <p:cNvPr id="120" name="Tekstfelt 119">
+            <a:extLst>
+              <a:ext uri="{FF2B5EF4-FFF2-40B4-BE49-F238E27FC236}">
+                <a16:creationId xmlns:a16="http://schemas.microsoft.com/office/drawing/2014/main" id="{2C32981F-F2A1-27A4-89F9-26FE3AB5FB8B}"/>
+              </a:ext>
+            </a:extLst>
+          </p:cNvPr>
+          <p:cNvSpPr txBox="1"/>
+          <p:nvPr/>
+        </p:nvSpPr>
+        <p:spPr>
+          <a:xfrm>
+            <a:off x="10669705" y="1686162"/>
+            <a:ext cx="258345" cy="276999"/>
+          </a:xfrm>
+          <a:prstGeom prst="rect">
+            <a:avLst/>
+          </a:prstGeom>
+          <a:noFill/>
+        </p:spPr>
+        <p:txBody>
+          <a:bodyPr wrap="square" rtlCol="0">
+            <a:spAutoFit/>
+          </a:bodyPr>
+          <a:lstStyle/>
+          <a:p>
+            <a:r>
+              <a:rPr lang="da-DK" sz="1200" dirty="0"/>
+              <a:t>+</a:t>
+            </a:r>
+          </a:p>
+        </p:txBody>
+      </p:sp>
+      <p:sp>
+        <p:nvSpPr>
+          <p:cNvPr id="121" name="Tekstfelt 120">
+            <a:extLst>
+              <a:ext uri="{FF2B5EF4-FFF2-40B4-BE49-F238E27FC236}">
+                <a16:creationId xmlns:a16="http://schemas.microsoft.com/office/drawing/2014/main" id="{7ABC160E-C06C-8B68-03D3-7F6A612FDCA5}"/>
+              </a:ext>
+            </a:extLst>
+          </p:cNvPr>
+          <p:cNvSpPr txBox="1"/>
+          <p:nvPr/>
+        </p:nvSpPr>
+        <p:spPr>
+          <a:xfrm>
+            <a:off x="10614497" y="2562032"/>
+            <a:ext cx="354850" cy="276999"/>
+          </a:xfrm>
+          <a:prstGeom prst="rect">
+            <a:avLst/>
+          </a:prstGeom>
+          <a:noFill/>
+        </p:spPr>
+        <p:txBody>
+          <a:bodyPr wrap="square" rtlCol="0">
+            <a:spAutoFit/>
+          </a:bodyPr>
+          <a:lstStyle/>
+          <a:p>
+            <a:r>
+              <a:rPr lang="da-DK" sz="1200" dirty="0"/>
+              <a:t>Vo</a:t>
+            </a:r>
+          </a:p>
+        </p:txBody>
+      </p:sp>
+      <p:grpSp>
+        <p:nvGrpSpPr>
+          <p:cNvPr id="122" name="Gruppe 121">
+            <a:extLst>
+              <a:ext uri="{FF2B5EF4-FFF2-40B4-BE49-F238E27FC236}">
+                <a16:creationId xmlns:a16="http://schemas.microsoft.com/office/drawing/2014/main" id="{2AD2F890-7FB7-6D11-99F3-2519D8771BBD}"/>
+              </a:ext>
+            </a:extLst>
+          </p:cNvPr>
+          <p:cNvGrpSpPr/>
+          <p:nvPr/>
+        </p:nvGrpSpPr>
+        <p:grpSpPr>
+          <a:xfrm rot="5400000">
+            <a:off x="6417675" y="2670878"/>
+            <a:ext cx="1096502" cy="1206183"/>
+            <a:chOff x="1282714" y="578229"/>
+            <a:chExt cx="1096502" cy="1206183"/>
+          </a:xfrm>
+        </p:grpSpPr>
+        <p:grpSp>
+          <p:nvGrpSpPr>
+            <p:cNvPr id="123" name="Gruppe 122">
+              <a:extLst>
+                <a:ext uri="{FF2B5EF4-FFF2-40B4-BE49-F238E27FC236}">
+                  <a16:creationId xmlns:a16="http://schemas.microsoft.com/office/drawing/2014/main" id="{921A6ADA-BC68-89D2-30C2-7FDA031ACDE8}"/>
+                </a:ext>
+              </a:extLst>
+            </p:cNvPr>
+            <p:cNvGrpSpPr/>
+            <p:nvPr/>
+          </p:nvGrpSpPr>
+          <p:grpSpPr>
+            <a:xfrm>
+              <a:off x="1282714" y="1606858"/>
+              <a:ext cx="1096502" cy="177554"/>
+              <a:chOff x="1282714" y="1606858"/>
+              <a:chExt cx="1096502" cy="177554"/>
+            </a:xfrm>
+          </p:grpSpPr>
+          <p:sp>
+            <p:nvSpPr>
+              <p:cNvPr id="125" name="Rektangel 124">
+                <a:extLst>
+                  <a:ext uri="{FF2B5EF4-FFF2-40B4-BE49-F238E27FC236}">
+                    <a16:creationId xmlns:a16="http://schemas.microsoft.com/office/drawing/2014/main" id="{0F1C9132-13AF-06BA-11A1-F9CD64F6619F}"/>
+                  </a:ext>
+                </a:extLst>
+              </p:cNvPr>
+              <p:cNvSpPr/>
+              <p:nvPr/>
+            </p:nvSpPr>
+            <p:spPr>
+              <a:xfrm>
+                <a:off x="1518082" y="1606858"/>
+                <a:ext cx="665825" cy="177554"/>
+              </a:xfrm>
+              <a:prstGeom prst="rect">
+                <a:avLst/>
+              </a:prstGeom>
+              <a:noFill/>
+              <a:ln w="12700">
+                <a:solidFill>
+                  <a:schemeClr val="tx1"/>
+                </a:solidFill>
+              </a:ln>
+            </p:spPr>
+            <p:style>
+              <a:lnRef idx="2">
+                <a:schemeClr val="accent1">
+                  <a:shade val="15000"/>
+                </a:schemeClr>
+              </a:lnRef>
+              <a:fillRef idx="1">
+                <a:schemeClr val="accent1"/>
+              </a:fillRef>
+              <a:effectRef idx="0">
+                <a:schemeClr val="accent1"/>
+              </a:effectRef>
+              <a:fontRef idx="minor">
+                <a:schemeClr val="lt1"/>
+              </a:fontRef>
+            </p:style>
+            <p:txBody>
+              <a:bodyPr rtlCol="0" anchor="ctr"/>
+              <a:lstStyle/>
+              <a:p>
+                <a:pPr algn="ctr"/>
+                <a:endParaRPr lang="da-DK"/>
+              </a:p>
+            </p:txBody>
+          </p:sp>
+          <p:cxnSp>
+            <p:nvCxnSpPr>
+              <p:cNvPr id="126" name="Lige forbindelse 125">
+                <a:extLst>
+                  <a:ext uri="{FF2B5EF4-FFF2-40B4-BE49-F238E27FC236}">
+                    <a16:creationId xmlns:a16="http://schemas.microsoft.com/office/drawing/2014/main" id="{ECD38856-8BA8-7AE2-1606-F6DD9BE7449C}"/>
+                  </a:ext>
+                </a:extLst>
+              </p:cNvPr>
+              <p:cNvCxnSpPr>
+                <a:cxnSpLocks/>
+                <a:stCxn id="125" idx="3"/>
+              </p:cNvCxnSpPr>
+              <p:nvPr/>
+            </p:nvCxnSpPr>
+            <p:spPr>
+              <a:xfrm>
+                <a:off x="2183907" y="1695635"/>
+                <a:ext cx="195309" cy="0"/>
+              </a:xfrm>
+              <a:prstGeom prst="line">
+                <a:avLst/>
+              </a:prstGeom>
+              <a:ln w="12700">
+                <a:solidFill>
+                  <a:schemeClr val="tx1"/>
+                </a:solidFill>
+              </a:ln>
+            </p:spPr>
+            <p:style>
+              <a:lnRef idx="2">
+                <a:schemeClr val="accent1"/>
+              </a:lnRef>
+              <a:fillRef idx="0">
+                <a:schemeClr val="accent1"/>
+              </a:fillRef>
+              <a:effectRef idx="1">
+                <a:schemeClr val="accent1"/>
+              </a:effectRef>
+              <a:fontRef idx="minor">
+                <a:schemeClr val="tx1"/>
+              </a:fontRef>
+            </p:style>
+          </p:cxnSp>
+          <p:cxnSp>
+            <p:nvCxnSpPr>
+              <p:cNvPr id="127" name="Lige forbindelse 126">
+                <a:extLst>
+                  <a:ext uri="{FF2B5EF4-FFF2-40B4-BE49-F238E27FC236}">
+                    <a16:creationId xmlns:a16="http://schemas.microsoft.com/office/drawing/2014/main" id="{709DD233-C6BD-191D-3832-30B0CBAAD421}"/>
+                  </a:ext>
+                </a:extLst>
+              </p:cNvPr>
+              <p:cNvCxnSpPr>
+                <a:cxnSpLocks/>
+              </p:cNvCxnSpPr>
+              <p:nvPr/>
+            </p:nvCxnSpPr>
+            <p:spPr>
+              <a:xfrm rot="16200000">
+                <a:off x="1399951" y="1585490"/>
+                <a:ext cx="0" cy="234474"/>
+              </a:xfrm>
+              <a:prstGeom prst="line">
+                <a:avLst/>
+              </a:prstGeom>
+              <a:ln w="12700">
+                <a:solidFill>
+                  <a:schemeClr val="tx1"/>
+                </a:solidFill>
+              </a:ln>
+            </p:spPr>
+            <p:style>
+              <a:lnRef idx="2">
+                <a:schemeClr val="accent1"/>
+              </a:lnRef>
+              <a:fillRef idx="0">
+                <a:schemeClr val="accent1"/>
+              </a:fillRef>
+              <a:effectRef idx="1">
+                <a:schemeClr val="accent1"/>
+              </a:effectRef>
+              <a:fontRef idx="minor">
+                <a:schemeClr val="tx1"/>
+              </a:fontRef>
+            </p:style>
+          </p:cxnSp>
+        </p:grpSp>
+        <p:sp>
+          <p:nvSpPr>
+            <p:cNvPr id="124" name="Tekstfelt 123">
+              <a:extLst>
+                <a:ext uri="{FF2B5EF4-FFF2-40B4-BE49-F238E27FC236}">
+                  <a16:creationId xmlns:a16="http://schemas.microsoft.com/office/drawing/2014/main" id="{3CE07E95-EB3F-42EB-00CD-087FA4CA8C15}"/>
+                </a:ext>
+              </a:extLst>
+            </p:cNvPr>
+            <p:cNvSpPr txBox="1"/>
+            <p:nvPr/>
+          </p:nvSpPr>
+          <p:spPr>
+            <a:xfrm rot="16200000">
+              <a:off x="1395999" y="950356"/>
+              <a:ext cx="1021254" cy="276999"/>
+            </a:xfrm>
+            <a:prstGeom prst="rect">
+              <a:avLst/>
+            </a:prstGeom>
+            <a:noFill/>
+          </p:spPr>
+          <p:txBody>
+            <a:bodyPr wrap="square" rtlCol="0">
+              <a:spAutoFit/>
+            </a:bodyPr>
+            <a:lstStyle/>
+            <a:p>
+              <a:r>
+                <a:rPr lang="da-DK" sz="1200" dirty="0"/>
+                <a:t>Re = 2k</a:t>
+              </a:r>
+              <a:r>
+                <a:rPr lang="el-GR" sz="1200" dirty="0"/>
+                <a:t>Ω</a:t>
+              </a:r>
+              <a:endParaRPr lang="da-DK" sz="1200" dirty="0"/>
+            </a:p>
+          </p:txBody>
+        </p:sp>
+      </p:grpSp>
+      <p:sp>
+        <p:nvSpPr>
+          <p:cNvPr id="3" name="Tekstfelt 2">
+            <a:extLst>
+              <a:ext uri="{FF2B5EF4-FFF2-40B4-BE49-F238E27FC236}">
+                <a16:creationId xmlns:a16="http://schemas.microsoft.com/office/drawing/2014/main" id="{641F100E-68AF-3739-1EA8-E61CF98E4BB4}"/>
+              </a:ext>
+            </a:extLst>
+          </p:cNvPr>
+          <p:cNvSpPr txBox="1"/>
+          <p:nvPr/>
+        </p:nvSpPr>
+        <p:spPr>
+          <a:xfrm>
+            <a:off x="7349506" y="2034156"/>
+            <a:ext cx="802403" cy="276999"/>
+          </a:xfrm>
+          <a:prstGeom prst="rect">
+            <a:avLst/>
+          </a:prstGeom>
+          <a:noFill/>
+        </p:spPr>
+        <p:txBody>
+          <a:bodyPr wrap="square" rtlCol="0">
+            <a:spAutoFit/>
+          </a:bodyPr>
+          <a:lstStyle/>
+          <a:p>
+            <a:r>
+              <a:rPr lang="da-DK" sz="1200" dirty="0"/>
+              <a:t>gm*</a:t>
+            </a:r>
+            <a:r>
+              <a:rPr lang="da-DK" sz="1200" dirty="0" err="1"/>
+              <a:t>Vbe</a:t>
+            </a:r>
+            <a:endParaRPr lang="da-DK" sz="1200" dirty="0"/>
+          </a:p>
+        </p:txBody>
+      </p:sp>
+      <p:grpSp>
+        <p:nvGrpSpPr>
+          <p:cNvPr id="4" name="Gruppe 3">
+            <a:extLst>
+              <a:ext uri="{FF2B5EF4-FFF2-40B4-BE49-F238E27FC236}">
+                <a16:creationId xmlns:a16="http://schemas.microsoft.com/office/drawing/2014/main" id="{76FB39A2-A728-5B1C-82A0-D3EA1679C086}"/>
+              </a:ext>
+            </a:extLst>
+          </p:cNvPr>
+          <p:cNvGrpSpPr/>
+          <p:nvPr/>
+        </p:nvGrpSpPr>
+        <p:grpSpPr>
+          <a:xfrm rot="5400000">
+            <a:off x="2952734" y="1607472"/>
+            <a:ext cx="1096502" cy="1196658"/>
+            <a:chOff x="1282714" y="587754"/>
+            <a:chExt cx="1096502" cy="1196658"/>
+          </a:xfrm>
+        </p:grpSpPr>
+        <p:grpSp>
+          <p:nvGrpSpPr>
+            <p:cNvPr id="5" name="Gruppe 4">
+              <a:extLst>
+                <a:ext uri="{FF2B5EF4-FFF2-40B4-BE49-F238E27FC236}">
+                  <a16:creationId xmlns:a16="http://schemas.microsoft.com/office/drawing/2014/main" id="{F334E3A3-5DB4-92A3-664E-F4406C64E350}"/>
+                </a:ext>
+              </a:extLst>
+            </p:cNvPr>
+            <p:cNvGrpSpPr/>
+            <p:nvPr/>
+          </p:nvGrpSpPr>
+          <p:grpSpPr>
+            <a:xfrm>
+              <a:off x="1282714" y="1606858"/>
+              <a:ext cx="1096502" cy="177554"/>
+              <a:chOff x="1282714" y="1606858"/>
+              <a:chExt cx="1096502" cy="177554"/>
+            </a:xfrm>
+          </p:grpSpPr>
+          <p:sp>
+            <p:nvSpPr>
+              <p:cNvPr id="7" name="Rektangel 6">
+                <a:extLst>
+                  <a:ext uri="{FF2B5EF4-FFF2-40B4-BE49-F238E27FC236}">
+                    <a16:creationId xmlns:a16="http://schemas.microsoft.com/office/drawing/2014/main" id="{26F845A8-9F5B-7E66-B4BD-1464978EB744}"/>
+                  </a:ext>
+                </a:extLst>
+              </p:cNvPr>
+              <p:cNvSpPr/>
+              <p:nvPr/>
+            </p:nvSpPr>
+            <p:spPr>
+              <a:xfrm>
+                <a:off x="1518082" y="1606858"/>
+                <a:ext cx="665825" cy="177554"/>
+              </a:xfrm>
+              <a:prstGeom prst="rect">
+                <a:avLst/>
+              </a:prstGeom>
+              <a:noFill/>
+              <a:ln w="12700">
+                <a:solidFill>
+                  <a:schemeClr val="tx1"/>
+                </a:solidFill>
+              </a:ln>
+            </p:spPr>
+            <p:style>
+              <a:lnRef idx="2">
+                <a:schemeClr val="accent1">
+                  <a:shade val="15000"/>
+                </a:schemeClr>
+              </a:lnRef>
+              <a:fillRef idx="1">
+                <a:schemeClr val="accent1"/>
+              </a:fillRef>
+              <a:effectRef idx="0">
+                <a:schemeClr val="accent1"/>
+              </a:effectRef>
+              <a:fontRef idx="minor">
+                <a:schemeClr val="lt1"/>
+              </a:fontRef>
+            </p:style>
+            <p:txBody>
+              <a:bodyPr rtlCol="0" anchor="ctr"/>
+              <a:lstStyle/>
+              <a:p>
+                <a:pPr algn="ctr"/>
+                <a:endParaRPr lang="da-DK"/>
+              </a:p>
+            </p:txBody>
+          </p:sp>
+          <p:cxnSp>
+            <p:nvCxnSpPr>
+              <p:cNvPr id="8" name="Lige forbindelse 7">
+                <a:extLst>
+                  <a:ext uri="{FF2B5EF4-FFF2-40B4-BE49-F238E27FC236}">
+                    <a16:creationId xmlns:a16="http://schemas.microsoft.com/office/drawing/2014/main" id="{5EED5E4C-C7ED-1369-29D3-3F98EE26E756}"/>
+                  </a:ext>
+                </a:extLst>
+              </p:cNvPr>
+              <p:cNvCxnSpPr>
+                <a:cxnSpLocks/>
+                <a:stCxn id="7" idx="3"/>
+              </p:cNvCxnSpPr>
+              <p:nvPr/>
+            </p:nvCxnSpPr>
+            <p:spPr>
+              <a:xfrm>
+                <a:off x="2183907" y="1695635"/>
+                <a:ext cx="195309" cy="0"/>
+              </a:xfrm>
+              <a:prstGeom prst="line">
+                <a:avLst/>
+              </a:prstGeom>
+              <a:ln w="12700">
+                <a:solidFill>
+                  <a:schemeClr val="tx1"/>
+                </a:solidFill>
+              </a:ln>
+            </p:spPr>
+            <p:style>
+              <a:lnRef idx="2">
+                <a:schemeClr val="accent1"/>
+              </a:lnRef>
+              <a:fillRef idx="0">
+                <a:schemeClr val="accent1"/>
+              </a:fillRef>
+              <a:effectRef idx="1">
+                <a:schemeClr val="accent1"/>
+              </a:effectRef>
+              <a:fontRef idx="minor">
+                <a:schemeClr val="tx1"/>
+              </a:fontRef>
+            </p:style>
+          </p:cxnSp>
+          <p:cxnSp>
+            <p:nvCxnSpPr>
+              <p:cNvPr id="9" name="Lige forbindelse 8">
+                <a:extLst>
+                  <a:ext uri="{FF2B5EF4-FFF2-40B4-BE49-F238E27FC236}">
+                    <a16:creationId xmlns:a16="http://schemas.microsoft.com/office/drawing/2014/main" id="{88F7E037-F608-9FCB-5E03-B7A4DF254075}"/>
+                  </a:ext>
+                </a:extLst>
+              </p:cNvPr>
+              <p:cNvCxnSpPr>
+                <a:cxnSpLocks/>
+              </p:cNvCxnSpPr>
+              <p:nvPr/>
+            </p:nvCxnSpPr>
+            <p:spPr>
+              <a:xfrm rot="16200000">
+                <a:off x="1399951" y="1585490"/>
+                <a:ext cx="0" cy="234474"/>
+              </a:xfrm>
+              <a:prstGeom prst="line">
+                <a:avLst/>
+              </a:prstGeom>
+              <a:ln w="12700">
+                <a:solidFill>
+                  <a:schemeClr val="tx1"/>
+                </a:solidFill>
+              </a:ln>
+            </p:spPr>
+            <p:style>
+              <a:lnRef idx="2">
+                <a:schemeClr val="accent1"/>
+              </a:lnRef>
+              <a:fillRef idx="0">
+                <a:schemeClr val="accent1"/>
+              </a:fillRef>
+              <a:effectRef idx="1">
+                <a:schemeClr val="accent1"/>
+              </a:effectRef>
+              <a:fontRef idx="minor">
+                <a:schemeClr val="tx1"/>
+              </a:fontRef>
+            </p:style>
+          </p:cxnSp>
+        </p:grpSp>
+        <p:sp>
+          <p:nvSpPr>
+            <p:cNvPr id="6" name="Tekstfelt 5">
+              <a:extLst>
+                <a:ext uri="{FF2B5EF4-FFF2-40B4-BE49-F238E27FC236}">
+                  <a16:creationId xmlns:a16="http://schemas.microsoft.com/office/drawing/2014/main" id="{3DE5FA01-DE8E-0222-1494-1B1E9F890996}"/>
+                </a:ext>
+              </a:extLst>
+            </p:cNvPr>
+            <p:cNvSpPr txBox="1"/>
+            <p:nvPr/>
+          </p:nvSpPr>
+          <p:spPr>
+            <a:xfrm rot="16200000">
+              <a:off x="1395999" y="959881"/>
+              <a:ext cx="1021254" cy="276999"/>
+            </a:xfrm>
+            <a:prstGeom prst="rect">
+              <a:avLst/>
+            </a:prstGeom>
+            <a:noFill/>
+          </p:spPr>
+          <p:txBody>
+            <a:bodyPr wrap="square" rtlCol="0">
+              <a:spAutoFit/>
+            </a:bodyPr>
+            <a:lstStyle/>
+            <a:p>
+              <a:r>
+                <a:rPr lang="da-DK" sz="1200" dirty="0"/>
+                <a:t>Rb1 = 56k</a:t>
+              </a:r>
+              <a:r>
+                <a:rPr lang="el-GR" sz="1200" dirty="0"/>
+                <a:t>Ω</a:t>
+              </a:r>
+              <a:endParaRPr lang="da-DK" sz="1200" dirty="0"/>
+            </a:p>
+          </p:txBody>
+        </p:sp>
+      </p:grpSp>
+      <p:cxnSp>
+        <p:nvCxnSpPr>
+          <p:cNvPr id="12" name="Lige forbindelse 11">
+            <a:extLst>
+              <a:ext uri="{FF2B5EF4-FFF2-40B4-BE49-F238E27FC236}">
+                <a16:creationId xmlns:a16="http://schemas.microsoft.com/office/drawing/2014/main" id="{9B3019E3-51F9-B035-863D-77131418ACFD}"/>
+              </a:ext>
+            </a:extLst>
+          </p:cNvPr>
+          <p:cNvCxnSpPr>
+            <a:cxnSpLocks/>
+          </p:cNvCxnSpPr>
+          <p:nvPr/>
+        </p:nvCxnSpPr>
+        <p:spPr>
+          <a:xfrm flipH="1">
+            <a:off x="2984335" y="2703766"/>
+            <a:ext cx="7091" cy="1109211"/>
+          </a:xfrm>
+          <a:prstGeom prst="line">
+            <a:avLst/>
+          </a:prstGeom>
+          <a:ln w="12700">
+            <a:solidFill>
+              <a:schemeClr val="tx1"/>
+            </a:solidFill>
+          </a:ln>
+        </p:spPr>
+        <p:style>
+          <a:lnRef idx="2">
+            <a:schemeClr val="accent1"/>
+          </a:lnRef>
+          <a:fillRef idx="0">
+            <a:schemeClr val="accent1"/>
+          </a:fillRef>
+          <a:effectRef idx="1">
+            <a:schemeClr val="accent1"/>
+          </a:effectRef>
+          <a:fontRef idx="minor">
+            <a:schemeClr val="tx1"/>
+          </a:fontRef>
+        </p:style>
+      </p:cxnSp>
+      <p:grpSp>
+        <p:nvGrpSpPr>
+          <p:cNvPr id="15" name="Gruppe 14">
+            <a:extLst>
+              <a:ext uri="{FF2B5EF4-FFF2-40B4-BE49-F238E27FC236}">
+                <a16:creationId xmlns:a16="http://schemas.microsoft.com/office/drawing/2014/main" id="{B953097F-AA36-5363-6389-9F1C3C1EB6CC}"/>
+              </a:ext>
+            </a:extLst>
+          </p:cNvPr>
+          <p:cNvGrpSpPr/>
+          <p:nvPr/>
+        </p:nvGrpSpPr>
+        <p:grpSpPr>
+          <a:xfrm rot="5400000">
+            <a:off x="1161418" y="1601198"/>
+            <a:ext cx="1096502" cy="1206183"/>
+            <a:chOff x="1282714" y="578229"/>
+            <a:chExt cx="1096502" cy="1206183"/>
+          </a:xfrm>
+        </p:grpSpPr>
+        <p:grpSp>
+          <p:nvGrpSpPr>
+            <p:cNvPr id="16" name="Gruppe 15">
+              <a:extLst>
+                <a:ext uri="{FF2B5EF4-FFF2-40B4-BE49-F238E27FC236}">
+                  <a16:creationId xmlns:a16="http://schemas.microsoft.com/office/drawing/2014/main" id="{740F3C25-1B5A-F0CB-0C6A-8E13BDC6E873}"/>
+                </a:ext>
+              </a:extLst>
+            </p:cNvPr>
+            <p:cNvGrpSpPr/>
+            <p:nvPr/>
+          </p:nvGrpSpPr>
+          <p:grpSpPr>
+            <a:xfrm>
+              <a:off x="1282714" y="1606858"/>
+              <a:ext cx="1096502" cy="177554"/>
+              <a:chOff x="1282714" y="1606858"/>
+              <a:chExt cx="1096502" cy="177554"/>
+            </a:xfrm>
+          </p:grpSpPr>
+          <p:sp>
+            <p:nvSpPr>
+              <p:cNvPr id="18" name="Rektangel 17">
+                <a:extLst>
+                  <a:ext uri="{FF2B5EF4-FFF2-40B4-BE49-F238E27FC236}">
+                    <a16:creationId xmlns:a16="http://schemas.microsoft.com/office/drawing/2014/main" id="{E14E6E9A-02E1-D393-C5A1-2390CDCE68EF}"/>
+                  </a:ext>
+                </a:extLst>
+              </p:cNvPr>
+              <p:cNvSpPr/>
+              <p:nvPr/>
+            </p:nvSpPr>
+            <p:spPr>
+              <a:xfrm>
+                <a:off x="1518082" y="1606858"/>
+                <a:ext cx="665825" cy="177554"/>
+              </a:xfrm>
+              <a:prstGeom prst="rect">
+                <a:avLst/>
+              </a:prstGeom>
+              <a:noFill/>
+              <a:ln w="12700">
+                <a:solidFill>
+                  <a:schemeClr val="tx1"/>
+                </a:solidFill>
+              </a:ln>
+            </p:spPr>
+            <p:style>
+              <a:lnRef idx="2">
+                <a:schemeClr val="accent1">
+                  <a:shade val="15000"/>
+                </a:schemeClr>
+              </a:lnRef>
+              <a:fillRef idx="1">
+                <a:schemeClr val="accent1"/>
+              </a:fillRef>
+              <a:effectRef idx="0">
+                <a:schemeClr val="accent1"/>
+              </a:effectRef>
+              <a:fontRef idx="minor">
+                <a:schemeClr val="lt1"/>
+              </a:fontRef>
+            </p:style>
+            <p:txBody>
+              <a:bodyPr rtlCol="0" anchor="ctr"/>
+              <a:lstStyle/>
+              <a:p>
+                <a:pPr algn="ctr"/>
+                <a:endParaRPr lang="da-DK"/>
+              </a:p>
+            </p:txBody>
+          </p:sp>
+          <p:cxnSp>
+            <p:nvCxnSpPr>
+              <p:cNvPr id="19" name="Lige forbindelse 18">
+                <a:extLst>
+                  <a:ext uri="{FF2B5EF4-FFF2-40B4-BE49-F238E27FC236}">
+                    <a16:creationId xmlns:a16="http://schemas.microsoft.com/office/drawing/2014/main" id="{725508E6-A624-7EE0-367A-0F0B5FB72307}"/>
+                  </a:ext>
+                </a:extLst>
+              </p:cNvPr>
+              <p:cNvCxnSpPr>
+                <a:cxnSpLocks/>
+                <a:stCxn id="18" idx="3"/>
+              </p:cNvCxnSpPr>
+              <p:nvPr/>
+            </p:nvCxnSpPr>
+            <p:spPr>
+              <a:xfrm>
+                <a:off x="2183907" y="1695635"/>
+                <a:ext cx="195309" cy="0"/>
+              </a:xfrm>
+              <a:prstGeom prst="line">
+                <a:avLst/>
+              </a:prstGeom>
+              <a:ln w="12700">
+                <a:solidFill>
+                  <a:schemeClr val="tx1"/>
+                </a:solidFill>
+              </a:ln>
+            </p:spPr>
+            <p:style>
+              <a:lnRef idx="2">
+                <a:schemeClr val="accent1"/>
+              </a:lnRef>
+              <a:fillRef idx="0">
+                <a:schemeClr val="accent1"/>
+              </a:fillRef>
+              <a:effectRef idx="1">
+                <a:schemeClr val="accent1"/>
+              </a:effectRef>
+              <a:fontRef idx="minor">
+                <a:schemeClr val="tx1"/>
+              </a:fontRef>
+            </p:style>
+          </p:cxnSp>
+          <p:cxnSp>
+            <p:nvCxnSpPr>
+              <p:cNvPr id="20" name="Lige forbindelse 19">
+                <a:extLst>
+                  <a:ext uri="{FF2B5EF4-FFF2-40B4-BE49-F238E27FC236}">
+                    <a16:creationId xmlns:a16="http://schemas.microsoft.com/office/drawing/2014/main" id="{2BCD1E8D-9230-4CF2-2AC4-75311303194B}"/>
+                  </a:ext>
+                </a:extLst>
+              </p:cNvPr>
+              <p:cNvCxnSpPr>
+                <a:cxnSpLocks/>
+              </p:cNvCxnSpPr>
+              <p:nvPr/>
+            </p:nvCxnSpPr>
+            <p:spPr>
+              <a:xfrm rot="16200000">
+                <a:off x="1399951" y="1585490"/>
+                <a:ext cx="0" cy="234474"/>
+              </a:xfrm>
+              <a:prstGeom prst="line">
+                <a:avLst/>
+              </a:prstGeom>
+              <a:ln w="12700">
+                <a:solidFill>
+                  <a:schemeClr val="tx1"/>
+                </a:solidFill>
+              </a:ln>
+            </p:spPr>
+            <p:style>
+              <a:lnRef idx="2">
+                <a:schemeClr val="accent1"/>
+              </a:lnRef>
+              <a:fillRef idx="0">
+                <a:schemeClr val="accent1"/>
+              </a:fillRef>
+              <a:effectRef idx="1">
+                <a:schemeClr val="accent1"/>
+              </a:effectRef>
+              <a:fontRef idx="minor">
+                <a:schemeClr val="tx1"/>
+              </a:fontRef>
+            </p:style>
+          </p:cxnSp>
+        </p:grpSp>
+        <p:sp>
+          <p:nvSpPr>
+            <p:cNvPr id="17" name="Tekstfelt 16">
+              <a:extLst>
+                <a:ext uri="{FF2B5EF4-FFF2-40B4-BE49-F238E27FC236}">
+                  <a16:creationId xmlns:a16="http://schemas.microsoft.com/office/drawing/2014/main" id="{DCDABFB7-04C6-FC58-8A5F-668166160F51}"/>
+                </a:ext>
+              </a:extLst>
+            </p:cNvPr>
+            <p:cNvSpPr txBox="1"/>
+            <p:nvPr/>
+          </p:nvSpPr>
+          <p:spPr>
+            <a:xfrm rot="16200000">
+              <a:off x="1395999" y="950356"/>
+              <a:ext cx="1021254" cy="276999"/>
+            </a:xfrm>
+            <a:prstGeom prst="rect">
+              <a:avLst/>
+            </a:prstGeom>
+            <a:noFill/>
+          </p:spPr>
+          <p:txBody>
+            <a:bodyPr wrap="square" rtlCol="0">
+              <a:spAutoFit/>
+            </a:bodyPr>
+            <a:lstStyle/>
+            <a:p>
+              <a:r>
+                <a:rPr lang="da-DK" sz="1200" dirty="0" err="1"/>
+                <a:t>Rs</a:t>
+              </a:r>
+              <a:r>
+                <a:rPr lang="da-DK" sz="1200" dirty="0"/>
+                <a:t> = 500</a:t>
+              </a:r>
+              <a:r>
+                <a:rPr lang="el-GR" sz="1200" dirty="0"/>
+                <a:t>Ω</a:t>
+              </a:r>
+              <a:endParaRPr lang="da-DK" sz="1200" dirty="0"/>
+            </a:p>
+          </p:txBody>
+        </p:sp>
+      </p:grpSp>
+    </p:spTree>
+    <p:extLst>
+      <p:ext uri="{BB962C8B-B14F-4D97-AF65-F5344CB8AC3E}">
+        <p14:creationId xmlns:p14="http://schemas.microsoft.com/office/powerpoint/2010/main" val="596345276"/>
+      </p:ext>
+    </p:extLst>
+  </p:cSld>
+  <p:clrMapOvr>
+    <a:masterClrMapping/>
+  </p:clrMapOvr>
+</p:sld>
+</file>
+
+<file path=ppt/slides/slide4.xml><?xml version="1.0" encoding="utf-8"?>
 <p:sld xmlns:a="http://schemas.openxmlformats.org/drawingml/2006/main" xmlns:r="http://schemas.openxmlformats.org/officeDocument/2006/relationships" xmlns:p="http://schemas.openxmlformats.org/presentationml/2006/main">
   <p:cSld>
     <p:spTree>

</xml_diff>